<commit_message>
Presentation updated (finished) as PPT and PDF
</commit_message>
<xml_diff>
--- a/Analyse/OOT-Projekt-Milestone-Presentation.pptx
+++ b/Analyse/OOT-Projekt-Milestone-Presentation.pptx
@@ -5,7 +5,7 @@
     <p:sldMasterId id="2147483648" r:id="rId1"/>
   </p:sldMasterIdLst>
   <p:notesMasterIdLst>
-    <p:notesMasterId r:id="rId28"/>
+    <p:notesMasterId r:id="rId32"/>
   </p:notesMasterIdLst>
   <p:sldIdLst>
     <p:sldId id="256" r:id="rId2"/>
@@ -34,6 +34,10 @@
     <p:sldId id="277" r:id="rId25"/>
     <p:sldId id="278" r:id="rId26"/>
     <p:sldId id="279" r:id="rId27"/>
+    <p:sldId id="283" r:id="rId28"/>
+    <p:sldId id="284" r:id="rId29"/>
+    <p:sldId id="285" r:id="rId30"/>
+    <p:sldId id="286" r:id="rId31"/>
   </p:sldIdLst>
   <p:sldSz cx="9144000" cy="6858000" type="screen4x3"/>
   <p:notesSz cx="6858000" cy="9144000"/>
@@ -2021,6 +2025,249 @@
 </p:notes>
 </file>
 
+<file path=ppt/notesSlides/notesSlide27.xml><?xml version="1.0" encoding="utf-8"?>
+<p:notes xmlns:a="http://schemas.openxmlformats.org/drawingml/2006/main" xmlns:r="http://schemas.openxmlformats.org/officeDocument/2006/relationships" xmlns:p="http://schemas.openxmlformats.org/presentationml/2006/main">
+  <p:cSld>
+    <p:spTree>
+      <p:nvGrpSpPr>
+        <p:cNvPr id="1" name=""/>
+        <p:cNvGrpSpPr/>
+        <p:nvPr/>
+      </p:nvGrpSpPr>
+      <p:grpSpPr>
+        <a:xfrm>
+          <a:off x="0" y="0"/>
+          <a:ext cx="0" cy="0"/>
+          <a:chOff x="0" y="0"/>
+          <a:chExt cx="0" cy="0"/>
+        </a:xfrm>
+      </p:grpSpPr>
+      <p:sp>
+        <p:nvSpPr>
+          <p:cNvPr id="2" name="Folienbildplatzhalter 1"/>
+          <p:cNvSpPr>
+            <a:spLocks noGrp="1" noRot="1" noChangeAspect="1"/>
+          </p:cNvSpPr>
+          <p:nvPr>
+            <p:ph type="sldImg"/>
+          </p:nvPr>
+        </p:nvSpPr>
+        <p:spPr/>
+      </p:sp>
+      <p:sp>
+        <p:nvSpPr>
+          <p:cNvPr id="3" name="Notizenplatzhalter 2"/>
+          <p:cNvSpPr>
+            <a:spLocks noGrp="1"/>
+          </p:cNvSpPr>
+          <p:nvPr>
+            <p:ph type="body" idx="1"/>
+          </p:nvPr>
+        </p:nvSpPr>
+        <p:spPr/>
+        <p:txBody>
+          <a:bodyPr>
+            <a:normAutofit/>
+          </a:bodyPr>
+          <a:lstStyle/>
+          <a:p>
+            <a:endParaRPr lang="de-DE"/>
+          </a:p>
+        </p:txBody>
+      </p:sp>
+      <p:sp>
+        <p:nvSpPr>
+          <p:cNvPr id="4" name="Foliennummernplatzhalter 3"/>
+          <p:cNvSpPr>
+            <a:spLocks noGrp="1"/>
+          </p:cNvSpPr>
+          <p:nvPr>
+            <p:ph type="sldNum" sz="quarter" idx="10"/>
+          </p:nvPr>
+        </p:nvSpPr>
+        <p:spPr/>
+        <p:txBody>
+          <a:bodyPr/>
+          <a:lstStyle/>
+          <a:p>
+            <a:fld id="{52C8AFA6-E92C-4EF3-92E1-75922C3E6757}" type="slidenum">
+              <a:rPr lang="de-DE" smtClean="0"/>
+              <a:t>27</a:t>
+            </a:fld>
+            <a:endParaRPr lang="de-DE"/>
+          </a:p>
+        </p:txBody>
+      </p:sp>
+    </p:spTree>
+  </p:cSld>
+  <p:clrMapOvr>
+    <a:masterClrMapping/>
+  </p:clrMapOvr>
+</p:notes>
+</file>
+
+<file path=ppt/notesSlides/notesSlide28.xml><?xml version="1.0" encoding="utf-8"?>
+<p:notes xmlns:a="http://schemas.openxmlformats.org/drawingml/2006/main" xmlns:r="http://schemas.openxmlformats.org/officeDocument/2006/relationships" xmlns:p="http://schemas.openxmlformats.org/presentationml/2006/main">
+  <p:cSld>
+    <p:spTree>
+      <p:nvGrpSpPr>
+        <p:cNvPr id="1" name=""/>
+        <p:cNvGrpSpPr/>
+        <p:nvPr/>
+      </p:nvGrpSpPr>
+      <p:grpSpPr>
+        <a:xfrm>
+          <a:off x="0" y="0"/>
+          <a:ext cx="0" cy="0"/>
+          <a:chOff x="0" y="0"/>
+          <a:chExt cx="0" cy="0"/>
+        </a:xfrm>
+      </p:grpSpPr>
+      <p:sp>
+        <p:nvSpPr>
+          <p:cNvPr id="2" name="Folienbildplatzhalter 1"/>
+          <p:cNvSpPr>
+            <a:spLocks noGrp="1" noRot="1" noChangeAspect="1"/>
+          </p:cNvSpPr>
+          <p:nvPr>
+            <p:ph type="sldImg"/>
+          </p:nvPr>
+        </p:nvSpPr>
+        <p:spPr/>
+      </p:sp>
+      <p:sp>
+        <p:nvSpPr>
+          <p:cNvPr id="3" name="Notizenplatzhalter 2"/>
+          <p:cNvSpPr>
+            <a:spLocks noGrp="1"/>
+          </p:cNvSpPr>
+          <p:nvPr>
+            <p:ph type="body" idx="1"/>
+          </p:nvPr>
+        </p:nvSpPr>
+        <p:spPr/>
+        <p:txBody>
+          <a:bodyPr>
+            <a:normAutofit/>
+          </a:bodyPr>
+          <a:lstStyle/>
+          <a:p>
+            <a:endParaRPr lang="de-DE"/>
+          </a:p>
+        </p:txBody>
+      </p:sp>
+      <p:sp>
+        <p:nvSpPr>
+          <p:cNvPr id="4" name="Foliennummernplatzhalter 3"/>
+          <p:cNvSpPr>
+            <a:spLocks noGrp="1"/>
+          </p:cNvSpPr>
+          <p:nvPr>
+            <p:ph type="sldNum" sz="quarter" idx="10"/>
+          </p:nvPr>
+        </p:nvSpPr>
+        <p:spPr/>
+        <p:txBody>
+          <a:bodyPr/>
+          <a:lstStyle/>
+          <a:p>
+            <a:fld id="{52C8AFA6-E92C-4EF3-92E1-75922C3E6757}" type="slidenum">
+              <a:rPr lang="de-DE" smtClean="0"/>
+              <a:t>28</a:t>
+            </a:fld>
+            <a:endParaRPr lang="de-DE"/>
+          </a:p>
+        </p:txBody>
+      </p:sp>
+    </p:spTree>
+  </p:cSld>
+  <p:clrMapOvr>
+    <a:masterClrMapping/>
+  </p:clrMapOvr>
+</p:notes>
+</file>
+
+<file path=ppt/notesSlides/notesSlide29.xml><?xml version="1.0" encoding="utf-8"?>
+<p:notes xmlns:a="http://schemas.openxmlformats.org/drawingml/2006/main" xmlns:r="http://schemas.openxmlformats.org/officeDocument/2006/relationships" xmlns:p="http://schemas.openxmlformats.org/presentationml/2006/main">
+  <p:cSld>
+    <p:spTree>
+      <p:nvGrpSpPr>
+        <p:cNvPr id="1" name=""/>
+        <p:cNvGrpSpPr/>
+        <p:nvPr/>
+      </p:nvGrpSpPr>
+      <p:grpSpPr>
+        <a:xfrm>
+          <a:off x="0" y="0"/>
+          <a:ext cx="0" cy="0"/>
+          <a:chOff x="0" y="0"/>
+          <a:chExt cx="0" cy="0"/>
+        </a:xfrm>
+      </p:grpSpPr>
+      <p:sp>
+        <p:nvSpPr>
+          <p:cNvPr id="2" name="Folienbildplatzhalter 1"/>
+          <p:cNvSpPr>
+            <a:spLocks noGrp="1" noRot="1" noChangeAspect="1"/>
+          </p:cNvSpPr>
+          <p:nvPr>
+            <p:ph type="sldImg"/>
+          </p:nvPr>
+        </p:nvSpPr>
+        <p:spPr/>
+      </p:sp>
+      <p:sp>
+        <p:nvSpPr>
+          <p:cNvPr id="3" name="Notizenplatzhalter 2"/>
+          <p:cNvSpPr>
+            <a:spLocks noGrp="1"/>
+          </p:cNvSpPr>
+          <p:nvPr>
+            <p:ph type="body" idx="1"/>
+          </p:nvPr>
+        </p:nvSpPr>
+        <p:spPr/>
+        <p:txBody>
+          <a:bodyPr>
+            <a:normAutofit/>
+          </a:bodyPr>
+          <a:lstStyle/>
+          <a:p>
+            <a:endParaRPr lang="de-DE"/>
+          </a:p>
+        </p:txBody>
+      </p:sp>
+      <p:sp>
+        <p:nvSpPr>
+          <p:cNvPr id="4" name="Foliennummernplatzhalter 3"/>
+          <p:cNvSpPr>
+            <a:spLocks noGrp="1"/>
+          </p:cNvSpPr>
+          <p:nvPr>
+            <p:ph type="sldNum" sz="quarter" idx="10"/>
+          </p:nvPr>
+        </p:nvSpPr>
+        <p:spPr/>
+        <p:txBody>
+          <a:bodyPr/>
+          <a:lstStyle/>
+          <a:p>
+            <a:fld id="{52C8AFA6-E92C-4EF3-92E1-75922C3E6757}" type="slidenum">
+              <a:rPr lang="de-DE" smtClean="0"/>
+              <a:t>29</a:t>
+            </a:fld>
+            <a:endParaRPr lang="de-DE"/>
+          </a:p>
+        </p:txBody>
+      </p:sp>
+    </p:spTree>
+  </p:cSld>
+  <p:clrMapOvr>
+    <a:masterClrMapping/>
+  </p:clrMapOvr>
+</p:notes>
+</file>
+
 <file path=ppt/notesSlides/notesSlide3.xml><?xml version="1.0" encoding="utf-8"?>
 <p:notes xmlns:a="http://schemas.openxmlformats.org/drawingml/2006/main" xmlns:r="http://schemas.openxmlformats.org/officeDocument/2006/relationships" xmlns:p="http://schemas.openxmlformats.org/presentationml/2006/main">
   <p:cSld>
@@ -2089,6 +2336,87 @@
             <a:fld id="{52C8AFA6-E92C-4EF3-92E1-75922C3E6757}" type="slidenum">
               <a:rPr lang="de-DE" smtClean="0"/>
               <a:t>3</a:t>
+            </a:fld>
+            <a:endParaRPr lang="de-DE"/>
+          </a:p>
+        </p:txBody>
+      </p:sp>
+    </p:spTree>
+  </p:cSld>
+  <p:clrMapOvr>
+    <a:masterClrMapping/>
+  </p:clrMapOvr>
+</p:notes>
+</file>
+
+<file path=ppt/notesSlides/notesSlide30.xml><?xml version="1.0" encoding="utf-8"?>
+<p:notes xmlns:a="http://schemas.openxmlformats.org/drawingml/2006/main" xmlns:r="http://schemas.openxmlformats.org/officeDocument/2006/relationships" xmlns:p="http://schemas.openxmlformats.org/presentationml/2006/main">
+  <p:cSld>
+    <p:spTree>
+      <p:nvGrpSpPr>
+        <p:cNvPr id="1" name=""/>
+        <p:cNvGrpSpPr/>
+        <p:nvPr/>
+      </p:nvGrpSpPr>
+      <p:grpSpPr>
+        <a:xfrm>
+          <a:off x="0" y="0"/>
+          <a:ext cx="0" cy="0"/>
+          <a:chOff x="0" y="0"/>
+          <a:chExt cx="0" cy="0"/>
+        </a:xfrm>
+      </p:grpSpPr>
+      <p:sp>
+        <p:nvSpPr>
+          <p:cNvPr id="2" name="Folienbildplatzhalter 1"/>
+          <p:cNvSpPr>
+            <a:spLocks noGrp="1" noRot="1" noChangeAspect="1"/>
+          </p:cNvSpPr>
+          <p:nvPr>
+            <p:ph type="sldImg"/>
+          </p:nvPr>
+        </p:nvSpPr>
+        <p:spPr/>
+      </p:sp>
+      <p:sp>
+        <p:nvSpPr>
+          <p:cNvPr id="3" name="Notizenplatzhalter 2"/>
+          <p:cNvSpPr>
+            <a:spLocks noGrp="1"/>
+          </p:cNvSpPr>
+          <p:nvPr>
+            <p:ph type="body" idx="1"/>
+          </p:nvPr>
+        </p:nvSpPr>
+        <p:spPr/>
+        <p:txBody>
+          <a:bodyPr>
+            <a:normAutofit/>
+          </a:bodyPr>
+          <a:lstStyle/>
+          <a:p>
+            <a:endParaRPr lang="de-DE"/>
+          </a:p>
+        </p:txBody>
+      </p:sp>
+      <p:sp>
+        <p:nvSpPr>
+          <p:cNvPr id="4" name="Foliennummernplatzhalter 3"/>
+          <p:cNvSpPr>
+            <a:spLocks noGrp="1"/>
+          </p:cNvSpPr>
+          <p:nvPr>
+            <p:ph type="sldNum" sz="quarter" idx="10"/>
+          </p:nvPr>
+        </p:nvSpPr>
+        <p:spPr/>
+        <p:txBody>
+          <a:bodyPr/>
+          <a:lstStyle/>
+          <a:p>
+            <a:fld id="{52C8AFA6-E92C-4EF3-92E1-75922C3E6757}" type="slidenum">
+              <a:rPr lang="de-DE" smtClean="0"/>
+              <a:t>30</a:t>
             </a:fld>
             <a:endParaRPr lang="de-DE"/>
           </a:p>
@@ -22899,6 +23227,2227 @@
 </p:sld>
 </file>
 
+<file path=ppt/slides/slide27.xml><?xml version="1.0" encoding="utf-8"?>
+<p:sld xmlns:a="http://schemas.openxmlformats.org/drawingml/2006/main" xmlns:r="http://schemas.openxmlformats.org/officeDocument/2006/relationships" xmlns:p="http://schemas.openxmlformats.org/presentationml/2006/main">
+  <p:cSld>
+    <p:spTree>
+      <p:nvGrpSpPr>
+        <p:cNvPr id="1" name=""/>
+        <p:cNvGrpSpPr/>
+        <p:nvPr/>
+      </p:nvGrpSpPr>
+      <p:grpSpPr>
+        <a:xfrm>
+          <a:off x="0" y="0"/>
+          <a:ext cx="0" cy="0"/>
+          <a:chOff x="0" y="0"/>
+          <a:chExt cx="0" cy="0"/>
+        </a:xfrm>
+      </p:grpSpPr>
+      <p:graphicFrame>
+        <p:nvGraphicFramePr>
+          <p:cNvPr id="8" name="Tabelle 7"/>
+          <p:cNvGraphicFramePr>
+            <a:graphicFrameLocks noGrp="1"/>
+          </p:cNvGraphicFramePr>
+          <p:nvPr/>
+        </p:nvGraphicFramePr>
+        <p:xfrm>
+          <a:off x="251520" y="6309320"/>
+          <a:ext cx="8640960" cy="370840"/>
+        </p:xfrm>
+        <a:graphic>
+          <a:graphicData uri="http://schemas.openxmlformats.org/drawingml/2006/table">
+            <a:tbl>
+              <a:tblPr firstRow="1" bandRow="1">
+                <a:tableStyleId>{2D5ABB26-0587-4C30-8999-92F81FD0307C}</a:tableStyleId>
+              </a:tblPr>
+              <a:tblGrid>
+                <a:gridCol w="4320480"/>
+                <a:gridCol w="4320480"/>
+              </a:tblGrid>
+              <a:tr h="370840">
+                <a:tc>
+                  <a:txBody>
+                    <a:bodyPr/>
+                    <a:lstStyle/>
+                    <a:p>
+                      <a:r>
+                        <a:rPr lang="de-DE" sz="1600" dirty="0" smtClean="0">
+                          <a:solidFill>
+                            <a:schemeClr val="accent1">
+                              <a:lumMod val="75000"/>
+                            </a:schemeClr>
+                          </a:solidFill>
+                          <a:latin typeface="Open Sans" pitchFamily="34" charset="0"/>
+                          <a:ea typeface="Open Sans" pitchFamily="34" charset="0"/>
+                          <a:cs typeface="Open Sans" pitchFamily="34" charset="0"/>
+                        </a:rPr>
+                        <a:t>Gruppe: Millionär // SS2016 // OOT</a:t>
+                      </a:r>
+                      <a:endParaRPr lang="de-DE" sz="1600" dirty="0">
+                        <a:solidFill>
+                          <a:schemeClr val="accent1">
+                            <a:lumMod val="75000"/>
+                          </a:schemeClr>
+                        </a:solidFill>
+                        <a:latin typeface="Open Sans" pitchFamily="34" charset="0"/>
+                        <a:ea typeface="Open Sans" pitchFamily="34" charset="0"/>
+                        <a:cs typeface="Open Sans" pitchFamily="34" charset="0"/>
+                      </a:endParaRPr>
+                    </a:p>
+                  </a:txBody>
+                  <a:tcPr>
+                    <a:lnL w="12700" cap="flat" cmpd="sng" algn="ctr">
+                      <a:noFill/>
+                      <a:prstDash val="solid"/>
+                      <a:round/>
+                      <a:headEnd type="none" w="med" len="med"/>
+                      <a:tailEnd type="none" w="med" len="med"/>
+                    </a:lnL>
+                    <a:lnR w="12700" cap="flat" cmpd="sng" algn="ctr">
+                      <a:noFill/>
+                      <a:prstDash val="solid"/>
+                      <a:round/>
+                      <a:headEnd type="none" w="med" len="med"/>
+                      <a:tailEnd type="none" w="med" len="med"/>
+                    </a:lnR>
+                    <a:lnT w="12700" cap="flat" cmpd="sng" algn="ctr">
+                      <a:solidFill>
+                        <a:schemeClr val="accent1">
+                          <a:lumMod val="50000"/>
+                        </a:schemeClr>
+                      </a:solidFill>
+                      <a:prstDash val="solid"/>
+                      <a:round/>
+                      <a:headEnd type="none" w="med" len="med"/>
+                      <a:tailEnd type="none" w="med" len="med"/>
+                    </a:lnT>
+                    <a:lnB w="12700" cap="flat" cmpd="sng" algn="ctr">
+                      <a:noFill/>
+                      <a:prstDash val="solid"/>
+                      <a:round/>
+                      <a:headEnd type="none" w="med" len="med"/>
+                      <a:tailEnd type="none" w="med" len="med"/>
+                    </a:lnB>
+                    <a:lnTlToBr w="12700" cmpd="sng">
+                      <a:noFill/>
+                      <a:prstDash val="solid"/>
+                    </a:lnTlToBr>
+                    <a:lnBlToTr w="12700" cmpd="sng">
+                      <a:noFill/>
+                      <a:prstDash val="solid"/>
+                    </a:lnBlToTr>
+                  </a:tcPr>
+                </a:tc>
+                <a:tc>
+                  <a:txBody>
+                    <a:bodyPr/>
+                    <a:lstStyle/>
+                    <a:p>
+                      <a:pPr algn="r"/>
+                      <a:r>
+                        <a:rPr lang="de-DE" sz="1600" dirty="0" smtClean="0">
+                          <a:solidFill>
+                            <a:schemeClr val="accent1">
+                              <a:lumMod val="75000"/>
+                            </a:schemeClr>
+                          </a:solidFill>
+                          <a:latin typeface="Open Sans" pitchFamily="34" charset="0"/>
+                          <a:ea typeface="Open Sans" pitchFamily="34" charset="0"/>
+                          <a:cs typeface="Open Sans" pitchFamily="34" charset="0"/>
+                        </a:rPr>
+                        <a:t>Folie: </a:t>
+                      </a:r>
+                      <a:fld id="{328F9375-978F-43FF-828F-1CDC57A20BD8}" type="slidenum">
+                        <a:rPr lang="de-DE" sz="1600" smtClean="0">
+                          <a:solidFill>
+                            <a:schemeClr val="accent1">
+                              <a:lumMod val="75000"/>
+                            </a:schemeClr>
+                          </a:solidFill>
+                          <a:latin typeface="Open Sans" pitchFamily="34" charset="0"/>
+                          <a:ea typeface="Open Sans" pitchFamily="34" charset="0"/>
+                          <a:cs typeface="Open Sans" pitchFamily="34" charset="0"/>
+                        </a:rPr>
+                        <a:t>27</a:t>
+                      </a:fld>
+                      <a:endParaRPr lang="de-DE" sz="1600" dirty="0">
+                        <a:solidFill>
+                          <a:schemeClr val="accent1">
+                            <a:lumMod val="75000"/>
+                          </a:schemeClr>
+                        </a:solidFill>
+                        <a:latin typeface="Open Sans" pitchFamily="34" charset="0"/>
+                        <a:ea typeface="Open Sans" pitchFamily="34" charset="0"/>
+                        <a:cs typeface="Open Sans" pitchFamily="34" charset="0"/>
+                      </a:endParaRPr>
+                    </a:p>
+                  </a:txBody>
+                  <a:tcPr>
+                    <a:lnL w="12700" cap="flat" cmpd="sng" algn="ctr">
+                      <a:noFill/>
+                      <a:prstDash val="solid"/>
+                      <a:round/>
+                      <a:headEnd type="none" w="med" len="med"/>
+                      <a:tailEnd type="none" w="med" len="med"/>
+                    </a:lnL>
+                    <a:lnR w="12700" cap="flat" cmpd="sng" algn="ctr">
+                      <a:noFill/>
+                      <a:prstDash val="solid"/>
+                      <a:round/>
+                      <a:headEnd type="none" w="med" len="med"/>
+                      <a:tailEnd type="none" w="med" len="med"/>
+                    </a:lnR>
+                    <a:lnT w="12700" cap="flat" cmpd="sng" algn="ctr">
+                      <a:solidFill>
+                        <a:schemeClr val="accent1">
+                          <a:lumMod val="50000"/>
+                        </a:schemeClr>
+                      </a:solidFill>
+                      <a:prstDash val="solid"/>
+                      <a:round/>
+                      <a:headEnd type="none" w="med" len="med"/>
+                      <a:tailEnd type="none" w="med" len="med"/>
+                    </a:lnT>
+                    <a:lnB w="12700" cap="flat" cmpd="sng" algn="ctr">
+                      <a:noFill/>
+                      <a:prstDash val="solid"/>
+                      <a:round/>
+                      <a:headEnd type="none" w="med" len="med"/>
+                      <a:tailEnd type="none" w="med" len="med"/>
+                    </a:lnB>
+                    <a:lnTlToBr w="12700" cmpd="sng">
+                      <a:noFill/>
+                      <a:prstDash val="solid"/>
+                    </a:lnTlToBr>
+                    <a:lnBlToTr w="12700" cmpd="sng">
+                      <a:noFill/>
+                      <a:prstDash val="solid"/>
+                    </a:lnBlToTr>
+                  </a:tcPr>
+                </a:tc>
+              </a:tr>
+            </a:tbl>
+          </a:graphicData>
+        </a:graphic>
+      </p:graphicFrame>
+      <p:graphicFrame>
+        <p:nvGraphicFramePr>
+          <p:cNvPr id="6" name="Tabelle 5"/>
+          <p:cNvGraphicFramePr>
+            <a:graphicFrameLocks noGrp="1"/>
+          </p:cNvGraphicFramePr>
+          <p:nvPr/>
+        </p:nvGraphicFramePr>
+        <p:xfrm>
+          <a:off x="395536" y="188640"/>
+          <a:ext cx="8496944" cy="370840"/>
+        </p:xfrm>
+        <a:graphic>
+          <a:graphicData uri="http://schemas.openxmlformats.org/drawingml/2006/table">
+            <a:tbl>
+              <a:tblPr firstRow="1" bandRow="1">
+                <a:tableStyleId>{2D5ABB26-0587-4C30-8999-92F81FD0307C}</a:tableStyleId>
+              </a:tblPr>
+              <a:tblGrid>
+                <a:gridCol w="5040560"/>
+                <a:gridCol w="3456384"/>
+              </a:tblGrid>
+              <a:tr h="370840">
+                <a:tc>
+                  <a:txBody>
+                    <a:bodyPr/>
+                    <a:lstStyle/>
+                    <a:p>
+                      <a:r>
+                        <a:rPr lang="de-DE" dirty="0" smtClean="0">
+                          <a:solidFill>
+                            <a:schemeClr val="tx1">
+                              <a:lumMod val="65000"/>
+                              <a:lumOff val="35000"/>
+                            </a:schemeClr>
+                          </a:solidFill>
+                          <a:latin typeface="Open Sans Light" pitchFamily="34" charset="0"/>
+                          <a:ea typeface="Open Sans Light" pitchFamily="34" charset="0"/>
+                          <a:cs typeface="Open Sans Light" pitchFamily="34" charset="0"/>
+                        </a:rPr>
+                        <a:t>Projekt:</a:t>
+                      </a:r>
+                      <a:r>
+                        <a:rPr lang="de-DE" baseline="0" dirty="0" smtClean="0">
+                          <a:solidFill>
+                            <a:schemeClr val="tx1">
+                              <a:lumMod val="65000"/>
+                              <a:lumOff val="35000"/>
+                            </a:schemeClr>
+                          </a:solidFill>
+                          <a:latin typeface="Open Sans Light" pitchFamily="34" charset="0"/>
+                          <a:ea typeface="Open Sans Light" pitchFamily="34" charset="0"/>
+                          <a:cs typeface="Open Sans Light" pitchFamily="34" charset="0"/>
+                        </a:rPr>
+                        <a:t> </a:t>
+                      </a:r>
+                      <a:r>
+                        <a:rPr lang="de-DE" dirty="0" smtClean="0">
+                          <a:solidFill>
+                            <a:schemeClr val="tx1">
+                              <a:lumMod val="65000"/>
+                              <a:lumOff val="35000"/>
+                            </a:schemeClr>
+                          </a:solidFill>
+                          <a:latin typeface="Open Sans Light" pitchFamily="34" charset="0"/>
+                          <a:ea typeface="Open Sans Light" pitchFamily="34" charset="0"/>
+                          <a:cs typeface="Open Sans Light" pitchFamily="34" charset="0"/>
+                        </a:rPr>
+                        <a:t>Who </a:t>
+                      </a:r>
+                      <a:r>
+                        <a:rPr lang="de-DE" dirty="0" err="1" smtClean="0">
+                          <a:solidFill>
+                            <a:schemeClr val="tx1">
+                              <a:lumMod val="65000"/>
+                              <a:lumOff val="35000"/>
+                            </a:schemeClr>
+                          </a:solidFill>
+                          <a:latin typeface="Open Sans Light" pitchFamily="34" charset="0"/>
+                          <a:ea typeface="Open Sans Light" pitchFamily="34" charset="0"/>
+                          <a:cs typeface="Open Sans Light" pitchFamily="34" charset="0"/>
+                        </a:rPr>
+                        <a:t>Wants</a:t>
+                      </a:r>
+                      <a:r>
+                        <a:rPr lang="de-DE" baseline="0" dirty="0" smtClean="0">
+                          <a:solidFill>
+                            <a:schemeClr val="tx1">
+                              <a:lumMod val="65000"/>
+                              <a:lumOff val="35000"/>
+                            </a:schemeClr>
+                          </a:solidFill>
+                          <a:latin typeface="Open Sans Light" pitchFamily="34" charset="0"/>
+                          <a:ea typeface="Open Sans Light" pitchFamily="34" charset="0"/>
+                          <a:cs typeface="Open Sans Light" pitchFamily="34" charset="0"/>
+                        </a:rPr>
+                        <a:t> </a:t>
+                      </a:r>
+                      <a:r>
+                        <a:rPr lang="de-DE" baseline="0" dirty="0" err="1" smtClean="0">
+                          <a:solidFill>
+                            <a:schemeClr val="tx1">
+                              <a:lumMod val="65000"/>
+                              <a:lumOff val="35000"/>
+                            </a:schemeClr>
+                          </a:solidFill>
+                          <a:latin typeface="Open Sans Light" pitchFamily="34" charset="0"/>
+                          <a:ea typeface="Open Sans Light" pitchFamily="34" charset="0"/>
+                          <a:cs typeface="Open Sans Light" pitchFamily="34" charset="0"/>
+                        </a:rPr>
+                        <a:t>to</a:t>
+                      </a:r>
+                      <a:r>
+                        <a:rPr lang="de-DE" baseline="0" dirty="0" smtClean="0">
+                          <a:solidFill>
+                            <a:schemeClr val="tx1">
+                              <a:lumMod val="65000"/>
+                              <a:lumOff val="35000"/>
+                            </a:schemeClr>
+                          </a:solidFill>
+                          <a:latin typeface="Open Sans Light" pitchFamily="34" charset="0"/>
+                          <a:ea typeface="Open Sans Light" pitchFamily="34" charset="0"/>
+                          <a:cs typeface="Open Sans Light" pitchFamily="34" charset="0"/>
+                        </a:rPr>
+                        <a:t> </a:t>
+                      </a:r>
+                      <a:r>
+                        <a:rPr lang="de-DE" baseline="0" dirty="0" err="1" smtClean="0">
+                          <a:solidFill>
+                            <a:schemeClr val="tx1">
+                              <a:lumMod val="65000"/>
+                              <a:lumOff val="35000"/>
+                            </a:schemeClr>
+                          </a:solidFill>
+                          <a:latin typeface="Open Sans Light" pitchFamily="34" charset="0"/>
+                          <a:ea typeface="Open Sans Light" pitchFamily="34" charset="0"/>
+                          <a:cs typeface="Open Sans Light" pitchFamily="34" charset="0"/>
+                        </a:rPr>
+                        <a:t>be</a:t>
+                      </a:r>
+                      <a:r>
+                        <a:rPr lang="de-DE" baseline="0" dirty="0" smtClean="0">
+                          <a:solidFill>
+                            <a:schemeClr val="tx1">
+                              <a:lumMod val="65000"/>
+                              <a:lumOff val="35000"/>
+                            </a:schemeClr>
+                          </a:solidFill>
+                          <a:latin typeface="Open Sans Light" pitchFamily="34" charset="0"/>
+                          <a:ea typeface="Open Sans Light" pitchFamily="34" charset="0"/>
+                          <a:cs typeface="Open Sans Light" pitchFamily="34" charset="0"/>
+                        </a:rPr>
+                        <a:t> a </a:t>
+                      </a:r>
+                      <a:r>
+                        <a:rPr lang="de-DE" baseline="0" dirty="0" err="1" smtClean="0">
+                          <a:solidFill>
+                            <a:schemeClr val="tx1">
+                              <a:lumMod val="65000"/>
+                              <a:lumOff val="35000"/>
+                            </a:schemeClr>
+                          </a:solidFill>
+                          <a:latin typeface="Open Sans Light" pitchFamily="34" charset="0"/>
+                          <a:ea typeface="Open Sans Light" pitchFamily="34" charset="0"/>
+                          <a:cs typeface="Open Sans Light" pitchFamily="34" charset="0"/>
+                        </a:rPr>
+                        <a:t>Millionaire</a:t>
+                      </a:r>
+                      <a:r>
+                        <a:rPr lang="de-DE" baseline="0" dirty="0" smtClean="0">
+                          <a:solidFill>
+                            <a:schemeClr val="tx1">
+                              <a:lumMod val="65000"/>
+                              <a:lumOff val="35000"/>
+                            </a:schemeClr>
+                          </a:solidFill>
+                          <a:latin typeface="Open Sans Light" pitchFamily="34" charset="0"/>
+                          <a:ea typeface="Open Sans Light" pitchFamily="34" charset="0"/>
+                          <a:cs typeface="Open Sans Light" pitchFamily="34" charset="0"/>
+                        </a:rPr>
+                        <a:t>?</a:t>
+                      </a:r>
+                      <a:endParaRPr lang="de-DE" dirty="0">
+                        <a:solidFill>
+                          <a:schemeClr val="tx1">
+                            <a:lumMod val="65000"/>
+                            <a:lumOff val="35000"/>
+                          </a:schemeClr>
+                        </a:solidFill>
+                        <a:latin typeface="Open Sans Light" pitchFamily="34" charset="0"/>
+                        <a:ea typeface="Open Sans Light" pitchFamily="34" charset="0"/>
+                        <a:cs typeface="Open Sans Light" pitchFamily="34" charset="0"/>
+                      </a:endParaRPr>
+                    </a:p>
+                  </a:txBody>
+                  <a:tcPr>
+                    <a:lnB w="12700" cap="flat" cmpd="sng" algn="ctr">
+                      <a:solidFill>
+                        <a:schemeClr val="accent1">
+                          <a:lumMod val="50000"/>
+                        </a:schemeClr>
+                      </a:solidFill>
+                      <a:prstDash val="solid"/>
+                      <a:round/>
+                      <a:headEnd type="none" w="med" len="med"/>
+                      <a:tailEnd type="none" w="med" len="med"/>
+                    </a:lnB>
+                  </a:tcPr>
+                </a:tc>
+                <a:tc>
+                  <a:txBody>
+                    <a:bodyPr/>
+                    <a:lstStyle/>
+                    <a:p>
+                      <a:pPr algn="r"/>
+                      <a:r>
+                        <a:rPr lang="de-DE" dirty="0" smtClean="0">
+                          <a:solidFill>
+                            <a:schemeClr val="tx1">
+                              <a:lumMod val="65000"/>
+                              <a:lumOff val="35000"/>
+                            </a:schemeClr>
+                          </a:solidFill>
+                          <a:latin typeface="Open Sans Light" pitchFamily="34" charset="0"/>
+                          <a:ea typeface="Open Sans Light" pitchFamily="34" charset="0"/>
+                          <a:cs typeface="Open Sans Light" pitchFamily="34" charset="0"/>
+                        </a:rPr>
+                        <a:t>Teil: Erweiterte Funktionalität</a:t>
+                      </a:r>
+                      <a:endParaRPr lang="de-DE" dirty="0">
+                        <a:solidFill>
+                          <a:schemeClr val="tx1">
+                            <a:lumMod val="65000"/>
+                            <a:lumOff val="35000"/>
+                          </a:schemeClr>
+                        </a:solidFill>
+                        <a:latin typeface="Open Sans Light" pitchFamily="34" charset="0"/>
+                        <a:ea typeface="Open Sans Light" pitchFamily="34" charset="0"/>
+                        <a:cs typeface="Open Sans Light" pitchFamily="34" charset="0"/>
+                      </a:endParaRPr>
+                    </a:p>
+                  </a:txBody>
+                  <a:tcPr>
+                    <a:lnB w="12700" cap="flat" cmpd="sng" algn="ctr">
+                      <a:solidFill>
+                        <a:schemeClr val="accent1">
+                          <a:lumMod val="50000"/>
+                        </a:schemeClr>
+                      </a:solidFill>
+                      <a:prstDash val="solid"/>
+                      <a:round/>
+                      <a:headEnd type="none" w="med" len="med"/>
+                      <a:tailEnd type="none" w="med" len="med"/>
+                    </a:lnB>
+                  </a:tcPr>
+                </a:tc>
+              </a:tr>
+            </a:tbl>
+          </a:graphicData>
+        </a:graphic>
+      </p:graphicFrame>
+      <p:sp>
+        <p:nvSpPr>
+          <p:cNvPr id="15" name="Textfeld 14"/>
+          <p:cNvSpPr txBox="1"/>
+          <p:nvPr/>
+        </p:nvSpPr>
+        <p:spPr>
+          <a:xfrm>
+            <a:off x="1115616" y="980728"/>
+            <a:ext cx="8028384" cy="584775"/>
+          </a:xfrm>
+          <a:prstGeom prst="rect">
+            <a:avLst/>
+          </a:prstGeom>
+          <a:noFill/>
+        </p:spPr>
+        <p:txBody>
+          <a:bodyPr wrap="square" rtlCol="0">
+            <a:spAutoFit/>
+          </a:bodyPr>
+          <a:lstStyle/>
+          <a:p>
+            <a:r>
+              <a:rPr lang="de-DE" sz="3200" dirty="0" smtClean="0">
+                <a:latin typeface="Open Sans Light" pitchFamily="34" charset="0"/>
+                <a:ea typeface="Open Sans Light" pitchFamily="34" charset="0"/>
+                <a:cs typeface="Open Sans Light" pitchFamily="34" charset="0"/>
+              </a:rPr>
+              <a:t>FRAGENKATALOG IN EINER DATENBANK</a:t>
+            </a:r>
+            <a:endParaRPr lang="de-DE" sz="3200" dirty="0">
+              <a:latin typeface="Open Sans Light" pitchFamily="34" charset="0"/>
+              <a:ea typeface="Open Sans Light" pitchFamily="34" charset="0"/>
+              <a:cs typeface="Open Sans Light" pitchFamily="34" charset="0"/>
+            </a:endParaRPr>
+          </a:p>
+        </p:txBody>
+      </p:sp>
+      <p:sp>
+        <p:nvSpPr>
+          <p:cNvPr id="9" name="Textfeld 8"/>
+          <p:cNvSpPr txBox="1"/>
+          <p:nvPr/>
+        </p:nvSpPr>
+        <p:spPr>
+          <a:xfrm>
+            <a:off x="323528" y="2348880"/>
+            <a:ext cx="8280920" cy="2215991"/>
+          </a:xfrm>
+          <a:prstGeom prst="rect">
+            <a:avLst/>
+          </a:prstGeom>
+          <a:noFill/>
+        </p:spPr>
+        <p:txBody>
+          <a:bodyPr wrap="square" rtlCol="0">
+            <a:spAutoFit/>
+          </a:bodyPr>
+          <a:lstStyle/>
+          <a:p>
+            <a:pPr>
+              <a:lnSpc>
+                <a:spcPct val="150000"/>
+              </a:lnSpc>
+              <a:buFont typeface="Courier New" pitchFamily="49" charset="0"/>
+              <a:buChar char="o"/>
+            </a:pPr>
+            <a:r>
+              <a:rPr lang="de-DE" dirty="0"/>
+              <a:t> </a:t>
+            </a:r>
+            <a:r>
+              <a:rPr lang="de-DE" dirty="0" smtClean="0">
+                <a:solidFill>
+                  <a:schemeClr val="tx1">
+                    <a:lumMod val="95000"/>
+                    <a:lumOff val="5000"/>
+                  </a:schemeClr>
+                </a:solidFill>
+                <a:latin typeface="Open Sans" pitchFamily="34" charset="0"/>
+                <a:ea typeface="Open Sans" pitchFamily="34" charset="0"/>
+                <a:cs typeface="Open Sans" pitchFamily="34" charset="0"/>
+              </a:rPr>
+              <a:t>Alle Fragen werden in einer zentralen Datenbank gespeichert</a:t>
+            </a:r>
+          </a:p>
+          <a:p>
+            <a:pPr>
+              <a:lnSpc>
+                <a:spcPct val="150000"/>
+              </a:lnSpc>
+              <a:spcBef>
+                <a:spcPts val="1800"/>
+              </a:spcBef>
+              <a:buFont typeface="Courier New" pitchFamily="49" charset="0"/>
+              <a:buChar char="o"/>
+            </a:pPr>
+            <a:r>
+              <a:rPr lang="de-DE" dirty="0">
+                <a:solidFill>
+                  <a:schemeClr val="tx1">
+                    <a:lumMod val="95000"/>
+                    <a:lumOff val="5000"/>
+                  </a:schemeClr>
+                </a:solidFill>
+                <a:latin typeface="Open Sans" pitchFamily="34" charset="0"/>
+                <a:ea typeface="Open Sans" pitchFamily="34" charset="0"/>
+                <a:cs typeface="Open Sans" pitchFamily="34" charset="0"/>
+              </a:rPr>
+              <a:t> </a:t>
+            </a:r>
+            <a:r>
+              <a:rPr lang="de-DE" dirty="0" smtClean="0">
+                <a:solidFill>
+                  <a:schemeClr val="tx1">
+                    <a:lumMod val="95000"/>
+                    <a:lumOff val="5000"/>
+                  </a:schemeClr>
+                </a:solidFill>
+                <a:latin typeface="Open Sans" pitchFamily="34" charset="0"/>
+                <a:ea typeface="Open Sans" pitchFamily="34" charset="0"/>
+                <a:cs typeface="Open Sans" pitchFamily="34" charset="0"/>
+              </a:rPr>
+              <a:t>Die Fragen sollen nach Schwierigkeit sortiert werden können</a:t>
+            </a:r>
+          </a:p>
+          <a:p>
+            <a:pPr>
+              <a:lnSpc>
+                <a:spcPct val="150000"/>
+              </a:lnSpc>
+              <a:spcBef>
+                <a:spcPts val="1800"/>
+              </a:spcBef>
+              <a:buFont typeface="Courier New" pitchFamily="49" charset="0"/>
+              <a:buChar char="o"/>
+            </a:pPr>
+            <a:r>
+              <a:rPr lang="de-DE" dirty="0">
+                <a:solidFill>
+                  <a:schemeClr val="tx1">
+                    <a:lumMod val="95000"/>
+                    <a:lumOff val="5000"/>
+                  </a:schemeClr>
+                </a:solidFill>
+                <a:latin typeface="Open Sans" pitchFamily="34" charset="0"/>
+                <a:ea typeface="Open Sans" pitchFamily="34" charset="0"/>
+                <a:cs typeface="Open Sans" pitchFamily="34" charset="0"/>
+              </a:rPr>
+              <a:t> </a:t>
+            </a:r>
+            <a:r>
+              <a:rPr lang="de-DE" dirty="0" smtClean="0">
+                <a:solidFill>
+                  <a:schemeClr val="tx1">
+                    <a:lumMod val="95000"/>
+                    <a:lumOff val="5000"/>
+                  </a:schemeClr>
+                </a:solidFill>
+                <a:latin typeface="Open Sans" pitchFamily="34" charset="0"/>
+                <a:ea typeface="Open Sans" pitchFamily="34" charset="0"/>
+                <a:cs typeface="Open Sans" pitchFamily="34" charset="0"/>
+              </a:rPr>
+              <a:t>Im Fall, dass keine Verbindung zu der Datenbank aufgebaut werden kann, soll eine lokale Datenbank als Ersatz verwendet werden können.</a:t>
+            </a:r>
+          </a:p>
+        </p:txBody>
+      </p:sp>
+      <p:pic>
+        <p:nvPicPr>
+          <p:cNvPr id="13314" name="Picture 2"/>
+          <p:cNvPicPr>
+            <a:picLocks noChangeAspect="1" noChangeArrowheads="1"/>
+          </p:cNvPicPr>
+          <p:nvPr/>
+        </p:nvPicPr>
+        <p:blipFill>
+          <a:blip r:embed="rId3" cstate="print"/>
+          <a:srcRect/>
+          <a:stretch>
+            <a:fillRect/>
+          </a:stretch>
+        </p:blipFill>
+        <p:spPr bwMode="auto">
+          <a:xfrm>
+            <a:off x="467544" y="836712"/>
+            <a:ext cx="557678" cy="743571"/>
+          </a:xfrm>
+          <a:prstGeom prst="rect">
+            <a:avLst/>
+          </a:prstGeom>
+          <a:noFill/>
+          <a:ln w="9525">
+            <a:noFill/>
+            <a:miter lim="800000"/>
+            <a:headEnd/>
+            <a:tailEnd/>
+          </a:ln>
+          <a:effectLst/>
+        </p:spPr>
+      </p:pic>
+    </p:spTree>
+  </p:cSld>
+  <p:clrMapOvr>
+    <a:masterClrMapping/>
+  </p:clrMapOvr>
+  <p:timing>
+    <p:tnLst>
+      <p:par>
+        <p:cTn id="1" dur="indefinite" restart="never" nodeType="tmRoot"/>
+      </p:par>
+    </p:tnLst>
+  </p:timing>
+</p:sld>
+</file>
+
+<file path=ppt/slides/slide28.xml><?xml version="1.0" encoding="utf-8"?>
+<p:sld xmlns:a="http://schemas.openxmlformats.org/drawingml/2006/main" xmlns:r="http://schemas.openxmlformats.org/officeDocument/2006/relationships" xmlns:p="http://schemas.openxmlformats.org/presentationml/2006/main">
+  <p:cSld>
+    <p:spTree>
+      <p:nvGrpSpPr>
+        <p:cNvPr id="1" name=""/>
+        <p:cNvGrpSpPr/>
+        <p:nvPr/>
+      </p:nvGrpSpPr>
+      <p:grpSpPr>
+        <a:xfrm>
+          <a:off x="0" y="0"/>
+          <a:ext cx="0" cy="0"/>
+          <a:chOff x="0" y="0"/>
+          <a:chExt cx="0" cy="0"/>
+        </a:xfrm>
+      </p:grpSpPr>
+      <p:graphicFrame>
+        <p:nvGraphicFramePr>
+          <p:cNvPr id="8" name="Tabelle 7"/>
+          <p:cNvGraphicFramePr>
+            <a:graphicFrameLocks noGrp="1"/>
+          </p:cNvGraphicFramePr>
+          <p:nvPr/>
+        </p:nvGraphicFramePr>
+        <p:xfrm>
+          <a:off x="251520" y="6309320"/>
+          <a:ext cx="8640960" cy="370840"/>
+        </p:xfrm>
+        <a:graphic>
+          <a:graphicData uri="http://schemas.openxmlformats.org/drawingml/2006/table">
+            <a:tbl>
+              <a:tblPr firstRow="1" bandRow="1">
+                <a:tableStyleId>{2D5ABB26-0587-4C30-8999-92F81FD0307C}</a:tableStyleId>
+              </a:tblPr>
+              <a:tblGrid>
+                <a:gridCol w="4320480"/>
+                <a:gridCol w="4320480"/>
+              </a:tblGrid>
+              <a:tr h="370840">
+                <a:tc>
+                  <a:txBody>
+                    <a:bodyPr/>
+                    <a:lstStyle/>
+                    <a:p>
+                      <a:r>
+                        <a:rPr lang="de-DE" sz="1600" dirty="0" smtClean="0">
+                          <a:solidFill>
+                            <a:schemeClr val="accent1">
+                              <a:lumMod val="75000"/>
+                            </a:schemeClr>
+                          </a:solidFill>
+                          <a:latin typeface="Open Sans" pitchFamily="34" charset="0"/>
+                          <a:ea typeface="Open Sans" pitchFamily="34" charset="0"/>
+                          <a:cs typeface="Open Sans" pitchFamily="34" charset="0"/>
+                        </a:rPr>
+                        <a:t>Gruppe: Millionär // SS2016 // OOT</a:t>
+                      </a:r>
+                      <a:endParaRPr lang="de-DE" sz="1600" dirty="0">
+                        <a:solidFill>
+                          <a:schemeClr val="accent1">
+                            <a:lumMod val="75000"/>
+                          </a:schemeClr>
+                        </a:solidFill>
+                        <a:latin typeface="Open Sans" pitchFamily="34" charset="0"/>
+                        <a:ea typeface="Open Sans" pitchFamily="34" charset="0"/>
+                        <a:cs typeface="Open Sans" pitchFamily="34" charset="0"/>
+                      </a:endParaRPr>
+                    </a:p>
+                  </a:txBody>
+                  <a:tcPr>
+                    <a:lnL w="12700" cap="flat" cmpd="sng" algn="ctr">
+                      <a:noFill/>
+                      <a:prstDash val="solid"/>
+                      <a:round/>
+                      <a:headEnd type="none" w="med" len="med"/>
+                      <a:tailEnd type="none" w="med" len="med"/>
+                    </a:lnL>
+                    <a:lnR w="12700" cap="flat" cmpd="sng" algn="ctr">
+                      <a:noFill/>
+                      <a:prstDash val="solid"/>
+                      <a:round/>
+                      <a:headEnd type="none" w="med" len="med"/>
+                      <a:tailEnd type="none" w="med" len="med"/>
+                    </a:lnR>
+                    <a:lnT w="12700" cap="flat" cmpd="sng" algn="ctr">
+                      <a:solidFill>
+                        <a:schemeClr val="accent1">
+                          <a:lumMod val="50000"/>
+                        </a:schemeClr>
+                      </a:solidFill>
+                      <a:prstDash val="solid"/>
+                      <a:round/>
+                      <a:headEnd type="none" w="med" len="med"/>
+                      <a:tailEnd type="none" w="med" len="med"/>
+                    </a:lnT>
+                    <a:lnB w="12700" cap="flat" cmpd="sng" algn="ctr">
+                      <a:noFill/>
+                      <a:prstDash val="solid"/>
+                      <a:round/>
+                      <a:headEnd type="none" w="med" len="med"/>
+                      <a:tailEnd type="none" w="med" len="med"/>
+                    </a:lnB>
+                    <a:lnTlToBr w="12700" cmpd="sng">
+                      <a:noFill/>
+                      <a:prstDash val="solid"/>
+                    </a:lnTlToBr>
+                    <a:lnBlToTr w="12700" cmpd="sng">
+                      <a:noFill/>
+                      <a:prstDash val="solid"/>
+                    </a:lnBlToTr>
+                  </a:tcPr>
+                </a:tc>
+                <a:tc>
+                  <a:txBody>
+                    <a:bodyPr/>
+                    <a:lstStyle/>
+                    <a:p>
+                      <a:pPr algn="r"/>
+                      <a:r>
+                        <a:rPr lang="de-DE" sz="1600" dirty="0" smtClean="0">
+                          <a:solidFill>
+                            <a:schemeClr val="accent1">
+                              <a:lumMod val="75000"/>
+                            </a:schemeClr>
+                          </a:solidFill>
+                          <a:latin typeface="Open Sans" pitchFamily="34" charset="0"/>
+                          <a:ea typeface="Open Sans" pitchFamily="34" charset="0"/>
+                          <a:cs typeface="Open Sans" pitchFamily="34" charset="0"/>
+                        </a:rPr>
+                        <a:t>Folie: </a:t>
+                      </a:r>
+                      <a:fld id="{328F9375-978F-43FF-828F-1CDC57A20BD8}" type="slidenum">
+                        <a:rPr lang="de-DE" sz="1600" smtClean="0">
+                          <a:solidFill>
+                            <a:schemeClr val="accent1">
+                              <a:lumMod val="75000"/>
+                            </a:schemeClr>
+                          </a:solidFill>
+                          <a:latin typeface="Open Sans" pitchFamily="34" charset="0"/>
+                          <a:ea typeface="Open Sans" pitchFamily="34" charset="0"/>
+                          <a:cs typeface="Open Sans" pitchFamily="34" charset="0"/>
+                        </a:rPr>
+                        <a:t>28</a:t>
+                      </a:fld>
+                      <a:endParaRPr lang="de-DE" sz="1600" dirty="0">
+                        <a:solidFill>
+                          <a:schemeClr val="accent1">
+                            <a:lumMod val="75000"/>
+                          </a:schemeClr>
+                        </a:solidFill>
+                        <a:latin typeface="Open Sans" pitchFamily="34" charset="0"/>
+                        <a:ea typeface="Open Sans" pitchFamily="34" charset="0"/>
+                        <a:cs typeface="Open Sans" pitchFamily="34" charset="0"/>
+                      </a:endParaRPr>
+                    </a:p>
+                  </a:txBody>
+                  <a:tcPr>
+                    <a:lnL w="12700" cap="flat" cmpd="sng" algn="ctr">
+                      <a:noFill/>
+                      <a:prstDash val="solid"/>
+                      <a:round/>
+                      <a:headEnd type="none" w="med" len="med"/>
+                      <a:tailEnd type="none" w="med" len="med"/>
+                    </a:lnL>
+                    <a:lnR w="12700" cap="flat" cmpd="sng" algn="ctr">
+                      <a:noFill/>
+                      <a:prstDash val="solid"/>
+                      <a:round/>
+                      <a:headEnd type="none" w="med" len="med"/>
+                      <a:tailEnd type="none" w="med" len="med"/>
+                    </a:lnR>
+                    <a:lnT w="12700" cap="flat" cmpd="sng" algn="ctr">
+                      <a:solidFill>
+                        <a:schemeClr val="accent1">
+                          <a:lumMod val="50000"/>
+                        </a:schemeClr>
+                      </a:solidFill>
+                      <a:prstDash val="solid"/>
+                      <a:round/>
+                      <a:headEnd type="none" w="med" len="med"/>
+                      <a:tailEnd type="none" w="med" len="med"/>
+                    </a:lnT>
+                    <a:lnB w="12700" cap="flat" cmpd="sng" algn="ctr">
+                      <a:noFill/>
+                      <a:prstDash val="solid"/>
+                      <a:round/>
+                      <a:headEnd type="none" w="med" len="med"/>
+                      <a:tailEnd type="none" w="med" len="med"/>
+                    </a:lnB>
+                    <a:lnTlToBr w="12700" cmpd="sng">
+                      <a:noFill/>
+                      <a:prstDash val="solid"/>
+                    </a:lnTlToBr>
+                    <a:lnBlToTr w="12700" cmpd="sng">
+                      <a:noFill/>
+                      <a:prstDash val="solid"/>
+                    </a:lnBlToTr>
+                  </a:tcPr>
+                </a:tc>
+              </a:tr>
+            </a:tbl>
+          </a:graphicData>
+        </a:graphic>
+      </p:graphicFrame>
+      <p:graphicFrame>
+        <p:nvGraphicFramePr>
+          <p:cNvPr id="6" name="Tabelle 5"/>
+          <p:cNvGraphicFramePr>
+            <a:graphicFrameLocks noGrp="1"/>
+          </p:cNvGraphicFramePr>
+          <p:nvPr/>
+        </p:nvGraphicFramePr>
+        <p:xfrm>
+          <a:off x="395536" y="188640"/>
+          <a:ext cx="8496944" cy="370840"/>
+        </p:xfrm>
+        <a:graphic>
+          <a:graphicData uri="http://schemas.openxmlformats.org/drawingml/2006/table">
+            <a:tbl>
+              <a:tblPr firstRow="1" bandRow="1">
+                <a:tableStyleId>{2D5ABB26-0587-4C30-8999-92F81FD0307C}</a:tableStyleId>
+              </a:tblPr>
+              <a:tblGrid>
+                <a:gridCol w="5040560"/>
+                <a:gridCol w="3456384"/>
+              </a:tblGrid>
+              <a:tr h="370840">
+                <a:tc>
+                  <a:txBody>
+                    <a:bodyPr/>
+                    <a:lstStyle/>
+                    <a:p>
+                      <a:r>
+                        <a:rPr lang="de-DE" dirty="0" smtClean="0">
+                          <a:solidFill>
+                            <a:schemeClr val="tx1">
+                              <a:lumMod val="65000"/>
+                              <a:lumOff val="35000"/>
+                            </a:schemeClr>
+                          </a:solidFill>
+                          <a:latin typeface="Open Sans Light" pitchFamily="34" charset="0"/>
+                          <a:ea typeface="Open Sans Light" pitchFamily="34" charset="0"/>
+                          <a:cs typeface="Open Sans Light" pitchFamily="34" charset="0"/>
+                        </a:rPr>
+                        <a:t>Projekt:</a:t>
+                      </a:r>
+                      <a:r>
+                        <a:rPr lang="de-DE" baseline="0" dirty="0" smtClean="0">
+                          <a:solidFill>
+                            <a:schemeClr val="tx1">
+                              <a:lumMod val="65000"/>
+                              <a:lumOff val="35000"/>
+                            </a:schemeClr>
+                          </a:solidFill>
+                          <a:latin typeface="Open Sans Light" pitchFamily="34" charset="0"/>
+                          <a:ea typeface="Open Sans Light" pitchFamily="34" charset="0"/>
+                          <a:cs typeface="Open Sans Light" pitchFamily="34" charset="0"/>
+                        </a:rPr>
+                        <a:t> </a:t>
+                      </a:r>
+                      <a:r>
+                        <a:rPr lang="de-DE" dirty="0" smtClean="0">
+                          <a:solidFill>
+                            <a:schemeClr val="tx1">
+                              <a:lumMod val="65000"/>
+                              <a:lumOff val="35000"/>
+                            </a:schemeClr>
+                          </a:solidFill>
+                          <a:latin typeface="Open Sans Light" pitchFamily="34" charset="0"/>
+                          <a:ea typeface="Open Sans Light" pitchFamily="34" charset="0"/>
+                          <a:cs typeface="Open Sans Light" pitchFamily="34" charset="0"/>
+                        </a:rPr>
+                        <a:t>Who </a:t>
+                      </a:r>
+                      <a:r>
+                        <a:rPr lang="de-DE" dirty="0" err="1" smtClean="0">
+                          <a:solidFill>
+                            <a:schemeClr val="tx1">
+                              <a:lumMod val="65000"/>
+                              <a:lumOff val="35000"/>
+                            </a:schemeClr>
+                          </a:solidFill>
+                          <a:latin typeface="Open Sans Light" pitchFamily="34" charset="0"/>
+                          <a:ea typeface="Open Sans Light" pitchFamily="34" charset="0"/>
+                          <a:cs typeface="Open Sans Light" pitchFamily="34" charset="0"/>
+                        </a:rPr>
+                        <a:t>Wants</a:t>
+                      </a:r>
+                      <a:r>
+                        <a:rPr lang="de-DE" baseline="0" dirty="0" smtClean="0">
+                          <a:solidFill>
+                            <a:schemeClr val="tx1">
+                              <a:lumMod val="65000"/>
+                              <a:lumOff val="35000"/>
+                            </a:schemeClr>
+                          </a:solidFill>
+                          <a:latin typeface="Open Sans Light" pitchFamily="34" charset="0"/>
+                          <a:ea typeface="Open Sans Light" pitchFamily="34" charset="0"/>
+                          <a:cs typeface="Open Sans Light" pitchFamily="34" charset="0"/>
+                        </a:rPr>
+                        <a:t> </a:t>
+                      </a:r>
+                      <a:r>
+                        <a:rPr lang="de-DE" baseline="0" dirty="0" err="1" smtClean="0">
+                          <a:solidFill>
+                            <a:schemeClr val="tx1">
+                              <a:lumMod val="65000"/>
+                              <a:lumOff val="35000"/>
+                            </a:schemeClr>
+                          </a:solidFill>
+                          <a:latin typeface="Open Sans Light" pitchFamily="34" charset="0"/>
+                          <a:ea typeface="Open Sans Light" pitchFamily="34" charset="0"/>
+                          <a:cs typeface="Open Sans Light" pitchFamily="34" charset="0"/>
+                        </a:rPr>
+                        <a:t>to</a:t>
+                      </a:r>
+                      <a:r>
+                        <a:rPr lang="de-DE" baseline="0" dirty="0" smtClean="0">
+                          <a:solidFill>
+                            <a:schemeClr val="tx1">
+                              <a:lumMod val="65000"/>
+                              <a:lumOff val="35000"/>
+                            </a:schemeClr>
+                          </a:solidFill>
+                          <a:latin typeface="Open Sans Light" pitchFamily="34" charset="0"/>
+                          <a:ea typeface="Open Sans Light" pitchFamily="34" charset="0"/>
+                          <a:cs typeface="Open Sans Light" pitchFamily="34" charset="0"/>
+                        </a:rPr>
+                        <a:t> </a:t>
+                      </a:r>
+                      <a:r>
+                        <a:rPr lang="de-DE" baseline="0" dirty="0" err="1" smtClean="0">
+                          <a:solidFill>
+                            <a:schemeClr val="tx1">
+                              <a:lumMod val="65000"/>
+                              <a:lumOff val="35000"/>
+                            </a:schemeClr>
+                          </a:solidFill>
+                          <a:latin typeface="Open Sans Light" pitchFamily="34" charset="0"/>
+                          <a:ea typeface="Open Sans Light" pitchFamily="34" charset="0"/>
+                          <a:cs typeface="Open Sans Light" pitchFamily="34" charset="0"/>
+                        </a:rPr>
+                        <a:t>be</a:t>
+                      </a:r>
+                      <a:r>
+                        <a:rPr lang="de-DE" baseline="0" dirty="0" smtClean="0">
+                          <a:solidFill>
+                            <a:schemeClr val="tx1">
+                              <a:lumMod val="65000"/>
+                              <a:lumOff val="35000"/>
+                            </a:schemeClr>
+                          </a:solidFill>
+                          <a:latin typeface="Open Sans Light" pitchFamily="34" charset="0"/>
+                          <a:ea typeface="Open Sans Light" pitchFamily="34" charset="0"/>
+                          <a:cs typeface="Open Sans Light" pitchFamily="34" charset="0"/>
+                        </a:rPr>
+                        <a:t> a </a:t>
+                      </a:r>
+                      <a:r>
+                        <a:rPr lang="de-DE" baseline="0" dirty="0" err="1" smtClean="0">
+                          <a:solidFill>
+                            <a:schemeClr val="tx1">
+                              <a:lumMod val="65000"/>
+                              <a:lumOff val="35000"/>
+                            </a:schemeClr>
+                          </a:solidFill>
+                          <a:latin typeface="Open Sans Light" pitchFamily="34" charset="0"/>
+                          <a:ea typeface="Open Sans Light" pitchFamily="34" charset="0"/>
+                          <a:cs typeface="Open Sans Light" pitchFamily="34" charset="0"/>
+                        </a:rPr>
+                        <a:t>Millionaire</a:t>
+                      </a:r>
+                      <a:r>
+                        <a:rPr lang="de-DE" baseline="0" dirty="0" smtClean="0">
+                          <a:solidFill>
+                            <a:schemeClr val="tx1">
+                              <a:lumMod val="65000"/>
+                              <a:lumOff val="35000"/>
+                            </a:schemeClr>
+                          </a:solidFill>
+                          <a:latin typeface="Open Sans Light" pitchFamily="34" charset="0"/>
+                          <a:ea typeface="Open Sans Light" pitchFamily="34" charset="0"/>
+                          <a:cs typeface="Open Sans Light" pitchFamily="34" charset="0"/>
+                        </a:rPr>
+                        <a:t>?</a:t>
+                      </a:r>
+                      <a:endParaRPr lang="de-DE" dirty="0">
+                        <a:solidFill>
+                          <a:schemeClr val="tx1">
+                            <a:lumMod val="65000"/>
+                            <a:lumOff val="35000"/>
+                          </a:schemeClr>
+                        </a:solidFill>
+                        <a:latin typeface="Open Sans Light" pitchFamily="34" charset="0"/>
+                        <a:ea typeface="Open Sans Light" pitchFamily="34" charset="0"/>
+                        <a:cs typeface="Open Sans Light" pitchFamily="34" charset="0"/>
+                      </a:endParaRPr>
+                    </a:p>
+                  </a:txBody>
+                  <a:tcPr>
+                    <a:lnB w="12700" cap="flat" cmpd="sng" algn="ctr">
+                      <a:solidFill>
+                        <a:schemeClr val="accent1">
+                          <a:lumMod val="50000"/>
+                        </a:schemeClr>
+                      </a:solidFill>
+                      <a:prstDash val="solid"/>
+                      <a:round/>
+                      <a:headEnd type="none" w="med" len="med"/>
+                      <a:tailEnd type="none" w="med" len="med"/>
+                    </a:lnB>
+                  </a:tcPr>
+                </a:tc>
+                <a:tc>
+                  <a:txBody>
+                    <a:bodyPr/>
+                    <a:lstStyle/>
+                    <a:p>
+                      <a:pPr algn="r"/>
+                      <a:r>
+                        <a:rPr lang="de-DE" dirty="0" smtClean="0">
+                          <a:solidFill>
+                            <a:schemeClr val="tx1">
+                              <a:lumMod val="65000"/>
+                              <a:lumOff val="35000"/>
+                            </a:schemeClr>
+                          </a:solidFill>
+                          <a:latin typeface="Open Sans Light" pitchFamily="34" charset="0"/>
+                          <a:ea typeface="Open Sans Light" pitchFamily="34" charset="0"/>
+                          <a:cs typeface="Open Sans Light" pitchFamily="34" charset="0"/>
+                        </a:rPr>
+                        <a:t>Teil: Erweiterte Funktionalität</a:t>
+                      </a:r>
+                      <a:endParaRPr lang="de-DE" dirty="0">
+                        <a:solidFill>
+                          <a:schemeClr val="tx1">
+                            <a:lumMod val="65000"/>
+                            <a:lumOff val="35000"/>
+                          </a:schemeClr>
+                        </a:solidFill>
+                        <a:latin typeface="Open Sans Light" pitchFamily="34" charset="0"/>
+                        <a:ea typeface="Open Sans Light" pitchFamily="34" charset="0"/>
+                        <a:cs typeface="Open Sans Light" pitchFamily="34" charset="0"/>
+                      </a:endParaRPr>
+                    </a:p>
+                  </a:txBody>
+                  <a:tcPr>
+                    <a:lnB w="12700" cap="flat" cmpd="sng" algn="ctr">
+                      <a:solidFill>
+                        <a:schemeClr val="accent1">
+                          <a:lumMod val="50000"/>
+                        </a:schemeClr>
+                      </a:solidFill>
+                      <a:prstDash val="solid"/>
+                      <a:round/>
+                      <a:headEnd type="none" w="med" len="med"/>
+                      <a:tailEnd type="none" w="med" len="med"/>
+                    </a:lnB>
+                  </a:tcPr>
+                </a:tc>
+              </a:tr>
+            </a:tbl>
+          </a:graphicData>
+        </a:graphic>
+      </p:graphicFrame>
+      <p:sp>
+        <p:nvSpPr>
+          <p:cNvPr id="15" name="Textfeld 14"/>
+          <p:cNvSpPr txBox="1"/>
+          <p:nvPr/>
+        </p:nvSpPr>
+        <p:spPr>
+          <a:xfrm>
+            <a:off x="1115616" y="980728"/>
+            <a:ext cx="8028384" cy="584775"/>
+          </a:xfrm>
+          <a:prstGeom prst="rect">
+            <a:avLst/>
+          </a:prstGeom>
+          <a:noFill/>
+        </p:spPr>
+        <p:txBody>
+          <a:bodyPr wrap="square" rtlCol="0">
+            <a:spAutoFit/>
+          </a:bodyPr>
+          <a:lstStyle/>
+          <a:p>
+            <a:r>
+              <a:rPr lang="de-DE" sz="3200" dirty="0" smtClean="0">
+                <a:latin typeface="Open Sans Light" pitchFamily="34" charset="0"/>
+                <a:ea typeface="Open Sans Light" pitchFamily="34" charset="0"/>
+                <a:cs typeface="Open Sans Light" pitchFamily="34" charset="0"/>
+              </a:rPr>
+              <a:t>HIGHSCORE VERWALTUNG</a:t>
+            </a:r>
+            <a:endParaRPr lang="de-DE" sz="3200" dirty="0">
+              <a:latin typeface="Open Sans Light" pitchFamily="34" charset="0"/>
+              <a:ea typeface="Open Sans Light" pitchFamily="34" charset="0"/>
+              <a:cs typeface="Open Sans Light" pitchFamily="34" charset="0"/>
+            </a:endParaRPr>
+          </a:p>
+        </p:txBody>
+      </p:sp>
+      <p:sp>
+        <p:nvSpPr>
+          <p:cNvPr id="9" name="Textfeld 8"/>
+          <p:cNvSpPr txBox="1"/>
+          <p:nvPr/>
+        </p:nvSpPr>
+        <p:spPr>
+          <a:xfrm>
+            <a:off x="323528" y="2348880"/>
+            <a:ext cx="8280920" cy="2631490"/>
+          </a:xfrm>
+          <a:prstGeom prst="rect">
+            <a:avLst/>
+          </a:prstGeom>
+          <a:noFill/>
+        </p:spPr>
+        <p:txBody>
+          <a:bodyPr wrap="square" rtlCol="0">
+            <a:spAutoFit/>
+          </a:bodyPr>
+          <a:lstStyle/>
+          <a:p>
+            <a:pPr>
+              <a:lnSpc>
+                <a:spcPct val="150000"/>
+              </a:lnSpc>
+              <a:buFont typeface="Courier New" pitchFamily="49" charset="0"/>
+              <a:buChar char="o"/>
+            </a:pPr>
+            <a:r>
+              <a:rPr lang="de-DE" dirty="0"/>
+              <a:t> </a:t>
+            </a:r>
+            <a:r>
+              <a:rPr lang="de-DE" dirty="0" smtClean="0">
+                <a:solidFill>
+                  <a:schemeClr val="tx1">
+                    <a:lumMod val="95000"/>
+                    <a:lumOff val="5000"/>
+                  </a:schemeClr>
+                </a:solidFill>
+                <a:latin typeface="Open Sans" pitchFamily="34" charset="0"/>
+                <a:ea typeface="Open Sans" pitchFamily="34" charset="0"/>
+                <a:cs typeface="Open Sans" pitchFamily="34" charset="0"/>
+              </a:rPr>
+              <a:t>Das Spiel soll es dem Nutzer erlauben, seine erreichten Gewinne zu Speichern und mit anderen Nutzern zu vergleichen</a:t>
+            </a:r>
+          </a:p>
+          <a:p>
+            <a:pPr>
+              <a:lnSpc>
+                <a:spcPct val="150000"/>
+              </a:lnSpc>
+              <a:spcBef>
+                <a:spcPts val="1800"/>
+              </a:spcBef>
+              <a:buFont typeface="Courier New" pitchFamily="49" charset="0"/>
+              <a:buChar char="o"/>
+            </a:pPr>
+            <a:r>
+              <a:rPr lang="de-DE" dirty="0">
+                <a:solidFill>
+                  <a:schemeClr val="tx1">
+                    <a:lumMod val="95000"/>
+                    <a:lumOff val="5000"/>
+                  </a:schemeClr>
+                </a:solidFill>
+                <a:latin typeface="Open Sans" pitchFamily="34" charset="0"/>
+                <a:ea typeface="Open Sans" pitchFamily="34" charset="0"/>
+                <a:cs typeface="Open Sans" pitchFamily="34" charset="0"/>
+              </a:rPr>
+              <a:t> </a:t>
+            </a:r>
+            <a:r>
+              <a:rPr lang="de-DE" dirty="0" smtClean="0">
+                <a:solidFill>
+                  <a:schemeClr val="tx1">
+                    <a:lumMod val="95000"/>
+                    <a:lumOff val="5000"/>
+                  </a:schemeClr>
+                </a:solidFill>
+                <a:latin typeface="Open Sans" pitchFamily="34" charset="0"/>
+                <a:ea typeface="Open Sans" pitchFamily="34" charset="0"/>
+                <a:cs typeface="Open Sans" pitchFamily="34" charset="0"/>
+              </a:rPr>
+              <a:t>Die Highscores sollen innerhalb der zentralen Datenbank verwaltet werden</a:t>
+            </a:r>
+          </a:p>
+          <a:p>
+            <a:pPr>
+              <a:lnSpc>
+                <a:spcPct val="150000"/>
+              </a:lnSpc>
+              <a:spcBef>
+                <a:spcPts val="1800"/>
+              </a:spcBef>
+              <a:buFont typeface="Courier New" pitchFamily="49" charset="0"/>
+              <a:buChar char="o"/>
+            </a:pPr>
+            <a:r>
+              <a:rPr lang="de-DE" dirty="0">
+                <a:solidFill>
+                  <a:schemeClr val="tx1">
+                    <a:lumMod val="95000"/>
+                    <a:lumOff val="5000"/>
+                  </a:schemeClr>
+                </a:solidFill>
+                <a:latin typeface="Open Sans" pitchFamily="34" charset="0"/>
+                <a:ea typeface="Open Sans" pitchFamily="34" charset="0"/>
+                <a:cs typeface="Open Sans" pitchFamily="34" charset="0"/>
+              </a:rPr>
+              <a:t> </a:t>
+            </a:r>
+            <a:r>
+              <a:rPr lang="de-DE" dirty="0" smtClean="0">
+                <a:solidFill>
+                  <a:schemeClr val="tx1">
+                    <a:lumMod val="95000"/>
+                    <a:lumOff val="5000"/>
+                  </a:schemeClr>
+                </a:solidFill>
+                <a:latin typeface="Open Sans" pitchFamily="34" charset="0"/>
+                <a:ea typeface="Open Sans" pitchFamily="34" charset="0"/>
+                <a:cs typeface="Open Sans" pitchFamily="34" charset="0"/>
+              </a:rPr>
+              <a:t>Es soll möglich sein, die besten zehn Highscores einzusehen</a:t>
+            </a:r>
+          </a:p>
+        </p:txBody>
+      </p:sp>
+      <p:pic>
+        <p:nvPicPr>
+          <p:cNvPr id="14338" name="Picture 2"/>
+          <p:cNvPicPr>
+            <a:picLocks noChangeAspect="1" noChangeArrowheads="1"/>
+          </p:cNvPicPr>
+          <p:nvPr/>
+        </p:nvPicPr>
+        <p:blipFill>
+          <a:blip r:embed="rId3" cstate="print"/>
+          <a:srcRect/>
+          <a:stretch>
+            <a:fillRect/>
+          </a:stretch>
+        </p:blipFill>
+        <p:spPr bwMode="auto">
+          <a:xfrm>
+            <a:off x="395536" y="908720"/>
+            <a:ext cx="633091" cy="633091"/>
+          </a:xfrm>
+          <a:prstGeom prst="rect">
+            <a:avLst/>
+          </a:prstGeom>
+          <a:noFill/>
+          <a:ln w="9525">
+            <a:noFill/>
+            <a:miter lim="800000"/>
+            <a:headEnd/>
+            <a:tailEnd/>
+          </a:ln>
+          <a:effectLst/>
+        </p:spPr>
+      </p:pic>
+    </p:spTree>
+  </p:cSld>
+  <p:clrMapOvr>
+    <a:masterClrMapping/>
+  </p:clrMapOvr>
+  <p:timing>
+    <p:tnLst>
+      <p:par>
+        <p:cTn id="1" dur="indefinite" restart="never" nodeType="tmRoot"/>
+      </p:par>
+    </p:tnLst>
+  </p:timing>
+</p:sld>
+</file>
+
+<file path=ppt/slides/slide29.xml><?xml version="1.0" encoding="utf-8"?>
+<p:sld xmlns:a="http://schemas.openxmlformats.org/drawingml/2006/main" xmlns:r="http://schemas.openxmlformats.org/officeDocument/2006/relationships" xmlns:p="http://schemas.openxmlformats.org/presentationml/2006/main">
+  <p:cSld>
+    <p:spTree>
+      <p:nvGrpSpPr>
+        <p:cNvPr id="1" name=""/>
+        <p:cNvGrpSpPr/>
+        <p:nvPr/>
+      </p:nvGrpSpPr>
+      <p:grpSpPr>
+        <a:xfrm>
+          <a:off x="0" y="0"/>
+          <a:ext cx="0" cy="0"/>
+          <a:chOff x="0" y="0"/>
+          <a:chExt cx="0" cy="0"/>
+        </a:xfrm>
+      </p:grpSpPr>
+      <p:graphicFrame>
+        <p:nvGraphicFramePr>
+          <p:cNvPr id="8" name="Tabelle 7"/>
+          <p:cNvGraphicFramePr>
+            <a:graphicFrameLocks noGrp="1"/>
+          </p:cNvGraphicFramePr>
+          <p:nvPr/>
+        </p:nvGraphicFramePr>
+        <p:xfrm>
+          <a:off x="251520" y="6309320"/>
+          <a:ext cx="8640960" cy="370840"/>
+        </p:xfrm>
+        <a:graphic>
+          <a:graphicData uri="http://schemas.openxmlformats.org/drawingml/2006/table">
+            <a:tbl>
+              <a:tblPr firstRow="1" bandRow="1">
+                <a:tableStyleId>{2D5ABB26-0587-4C30-8999-92F81FD0307C}</a:tableStyleId>
+              </a:tblPr>
+              <a:tblGrid>
+                <a:gridCol w="4320480"/>
+                <a:gridCol w="4320480"/>
+              </a:tblGrid>
+              <a:tr h="370840">
+                <a:tc>
+                  <a:txBody>
+                    <a:bodyPr/>
+                    <a:lstStyle/>
+                    <a:p>
+                      <a:r>
+                        <a:rPr lang="de-DE" sz="1600" dirty="0" smtClean="0">
+                          <a:solidFill>
+                            <a:schemeClr val="accent1">
+                              <a:lumMod val="75000"/>
+                            </a:schemeClr>
+                          </a:solidFill>
+                          <a:latin typeface="Open Sans" pitchFamily="34" charset="0"/>
+                          <a:ea typeface="Open Sans" pitchFamily="34" charset="0"/>
+                          <a:cs typeface="Open Sans" pitchFamily="34" charset="0"/>
+                        </a:rPr>
+                        <a:t>Gruppe: Millionär // SS2016 // OOT</a:t>
+                      </a:r>
+                      <a:endParaRPr lang="de-DE" sz="1600" dirty="0">
+                        <a:solidFill>
+                          <a:schemeClr val="accent1">
+                            <a:lumMod val="75000"/>
+                          </a:schemeClr>
+                        </a:solidFill>
+                        <a:latin typeface="Open Sans" pitchFamily="34" charset="0"/>
+                        <a:ea typeface="Open Sans" pitchFamily="34" charset="0"/>
+                        <a:cs typeface="Open Sans" pitchFamily="34" charset="0"/>
+                      </a:endParaRPr>
+                    </a:p>
+                  </a:txBody>
+                  <a:tcPr>
+                    <a:lnL w="12700" cap="flat" cmpd="sng" algn="ctr">
+                      <a:noFill/>
+                      <a:prstDash val="solid"/>
+                      <a:round/>
+                      <a:headEnd type="none" w="med" len="med"/>
+                      <a:tailEnd type="none" w="med" len="med"/>
+                    </a:lnL>
+                    <a:lnR w="12700" cap="flat" cmpd="sng" algn="ctr">
+                      <a:noFill/>
+                      <a:prstDash val="solid"/>
+                      <a:round/>
+                      <a:headEnd type="none" w="med" len="med"/>
+                      <a:tailEnd type="none" w="med" len="med"/>
+                    </a:lnR>
+                    <a:lnT w="12700" cap="flat" cmpd="sng" algn="ctr">
+                      <a:solidFill>
+                        <a:schemeClr val="accent1">
+                          <a:lumMod val="50000"/>
+                        </a:schemeClr>
+                      </a:solidFill>
+                      <a:prstDash val="solid"/>
+                      <a:round/>
+                      <a:headEnd type="none" w="med" len="med"/>
+                      <a:tailEnd type="none" w="med" len="med"/>
+                    </a:lnT>
+                    <a:lnB w="12700" cap="flat" cmpd="sng" algn="ctr">
+                      <a:noFill/>
+                      <a:prstDash val="solid"/>
+                      <a:round/>
+                      <a:headEnd type="none" w="med" len="med"/>
+                      <a:tailEnd type="none" w="med" len="med"/>
+                    </a:lnB>
+                    <a:lnTlToBr w="12700" cmpd="sng">
+                      <a:noFill/>
+                      <a:prstDash val="solid"/>
+                    </a:lnTlToBr>
+                    <a:lnBlToTr w="12700" cmpd="sng">
+                      <a:noFill/>
+                      <a:prstDash val="solid"/>
+                    </a:lnBlToTr>
+                  </a:tcPr>
+                </a:tc>
+                <a:tc>
+                  <a:txBody>
+                    <a:bodyPr/>
+                    <a:lstStyle/>
+                    <a:p>
+                      <a:pPr algn="r"/>
+                      <a:r>
+                        <a:rPr lang="de-DE" sz="1600" dirty="0" smtClean="0">
+                          <a:solidFill>
+                            <a:schemeClr val="accent1">
+                              <a:lumMod val="75000"/>
+                            </a:schemeClr>
+                          </a:solidFill>
+                          <a:latin typeface="Open Sans" pitchFamily="34" charset="0"/>
+                          <a:ea typeface="Open Sans" pitchFamily="34" charset="0"/>
+                          <a:cs typeface="Open Sans" pitchFamily="34" charset="0"/>
+                        </a:rPr>
+                        <a:t>Folie: </a:t>
+                      </a:r>
+                      <a:fld id="{328F9375-978F-43FF-828F-1CDC57A20BD8}" type="slidenum">
+                        <a:rPr lang="de-DE" sz="1600" smtClean="0">
+                          <a:solidFill>
+                            <a:schemeClr val="accent1">
+                              <a:lumMod val="75000"/>
+                            </a:schemeClr>
+                          </a:solidFill>
+                          <a:latin typeface="Open Sans" pitchFamily="34" charset="0"/>
+                          <a:ea typeface="Open Sans" pitchFamily="34" charset="0"/>
+                          <a:cs typeface="Open Sans" pitchFamily="34" charset="0"/>
+                        </a:rPr>
+                        <a:t>29</a:t>
+                      </a:fld>
+                      <a:endParaRPr lang="de-DE" sz="1600" dirty="0">
+                        <a:solidFill>
+                          <a:schemeClr val="accent1">
+                            <a:lumMod val="75000"/>
+                          </a:schemeClr>
+                        </a:solidFill>
+                        <a:latin typeface="Open Sans" pitchFamily="34" charset="0"/>
+                        <a:ea typeface="Open Sans" pitchFamily="34" charset="0"/>
+                        <a:cs typeface="Open Sans" pitchFamily="34" charset="0"/>
+                      </a:endParaRPr>
+                    </a:p>
+                  </a:txBody>
+                  <a:tcPr>
+                    <a:lnL w="12700" cap="flat" cmpd="sng" algn="ctr">
+                      <a:noFill/>
+                      <a:prstDash val="solid"/>
+                      <a:round/>
+                      <a:headEnd type="none" w="med" len="med"/>
+                      <a:tailEnd type="none" w="med" len="med"/>
+                    </a:lnL>
+                    <a:lnR w="12700" cap="flat" cmpd="sng" algn="ctr">
+                      <a:noFill/>
+                      <a:prstDash val="solid"/>
+                      <a:round/>
+                      <a:headEnd type="none" w="med" len="med"/>
+                      <a:tailEnd type="none" w="med" len="med"/>
+                    </a:lnR>
+                    <a:lnT w="12700" cap="flat" cmpd="sng" algn="ctr">
+                      <a:solidFill>
+                        <a:schemeClr val="accent1">
+                          <a:lumMod val="50000"/>
+                        </a:schemeClr>
+                      </a:solidFill>
+                      <a:prstDash val="solid"/>
+                      <a:round/>
+                      <a:headEnd type="none" w="med" len="med"/>
+                      <a:tailEnd type="none" w="med" len="med"/>
+                    </a:lnT>
+                    <a:lnB w="12700" cap="flat" cmpd="sng" algn="ctr">
+                      <a:noFill/>
+                      <a:prstDash val="solid"/>
+                      <a:round/>
+                      <a:headEnd type="none" w="med" len="med"/>
+                      <a:tailEnd type="none" w="med" len="med"/>
+                    </a:lnB>
+                    <a:lnTlToBr w="12700" cmpd="sng">
+                      <a:noFill/>
+                      <a:prstDash val="solid"/>
+                    </a:lnTlToBr>
+                    <a:lnBlToTr w="12700" cmpd="sng">
+                      <a:noFill/>
+                      <a:prstDash val="solid"/>
+                    </a:lnBlToTr>
+                  </a:tcPr>
+                </a:tc>
+              </a:tr>
+            </a:tbl>
+          </a:graphicData>
+        </a:graphic>
+      </p:graphicFrame>
+      <p:graphicFrame>
+        <p:nvGraphicFramePr>
+          <p:cNvPr id="6" name="Tabelle 5"/>
+          <p:cNvGraphicFramePr>
+            <a:graphicFrameLocks noGrp="1"/>
+          </p:cNvGraphicFramePr>
+          <p:nvPr/>
+        </p:nvGraphicFramePr>
+        <p:xfrm>
+          <a:off x="395536" y="188640"/>
+          <a:ext cx="8496944" cy="370840"/>
+        </p:xfrm>
+        <a:graphic>
+          <a:graphicData uri="http://schemas.openxmlformats.org/drawingml/2006/table">
+            <a:tbl>
+              <a:tblPr firstRow="1" bandRow="1">
+                <a:tableStyleId>{2D5ABB26-0587-4C30-8999-92F81FD0307C}</a:tableStyleId>
+              </a:tblPr>
+              <a:tblGrid>
+                <a:gridCol w="4248472"/>
+                <a:gridCol w="4248472"/>
+              </a:tblGrid>
+              <a:tr h="370840">
+                <a:tc>
+                  <a:txBody>
+                    <a:bodyPr/>
+                    <a:lstStyle/>
+                    <a:p>
+                      <a:r>
+                        <a:rPr lang="de-DE" dirty="0" smtClean="0">
+                          <a:solidFill>
+                            <a:schemeClr val="tx1">
+                              <a:lumMod val="65000"/>
+                              <a:lumOff val="35000"/>
+                            </a:schemeClr>
+                          </a:solidFill>
+                          <a:latin typeface="Open Sans Light" pitchFamily="34" charset="0"/>
+                          <a:ea typeface="Open Sans Light" pitchFamily="34" charset="0"/>
+                          <a:cs typeface="Open Sans Light" pitchFamily="34" charset="0"/>
+                        </a:rPr>
+                        <a:t>Projekt:</a:t>
+                      </a:r>
+                      <a:r>
+                        <a:rPr lang="de-DE" baseline="0" dirty="0" smtClean="0">
+                          <a:solidFill>
+                            <a:schemeClr val="tx1">
+                              <a:lumMod val="65000"/>
+                              <a:lumOff val="35000"/>
+                            </a:schemeClr>
+                          </a:solidFill>
+                          <a:latin typeface="Open Sans Light" pitchFamily="34" charset="0"/>
+                          <a:ea typeface="Open Sans Light" pitchFamily="34" charset="0"/>
+                          <a:cs typeface="Open Sans Light" pitchFamily="34" charset="0"/>
+                        </a:rPr>
+                        <a:t> </a:t>
+                      </a:r>
+                      <a:r>
+                        <a:rPr lang="de-DE" dirty="0" smtClean="0">
+                          <a:solidFill>
+                            <a:schemeClr val="tx1">
+                              <a:lumMod val="65000"/>
+                              <a:lumOff val="35000"/>
+                            </a:schemeClr>
+                          </a:solidFill>
+                          <a:latin typeface="Open Sans Light" pitchFamily="34" charset="0"/>
+                          <a:ea typeface="Open Sans Light" pitchFamily="34" charset="0"/>
+                          <a:cs typeface="Open Sans Light" pitchFamily="34" charset="0"/>
+                        </a:rPr>
+                        <a:t>Who </a:t>
+                      </a:r>
+                      <a:r>
+                        <a:rPr lang="de-DE" dirty="0" err="1" smtClean="0">
+                          <a:solidFill>
+                            <a:schemeClr val="tx1">
+                              <a:lumMod val="65000"/>
+                              <a:lumOff val="35000"/>
+                            </a:schemeClr>
+                          </a:solidFill>
+                          <a:latin typeface="Open Sans Light" pitchFamily="34" charset="0"/>
+                          <a:ea typeface="Open Sans Light" pitchFamily="34" charset="0"/>
+                          <a:cs typeface="Open Sans Light" pitchFamily="34" charset="0"/>
+                        </a:rPr>
+                        <a:t>Wants</a:t>
+                      </a:r>
+                      <a:r>
+                        <a:rPr lang="de-DE" baseline="0" dirty="0" smtClean="0">
+                          <a:solidFill>
+                            <a:schemeClr val="tx1">
+                              <a:lumMod val="65000"/>
+                              <a:lumOff val="35000"/>
+                            </a:schemeClr>
+                          </a:solidFill>
+                          <a:latin typeface="Open Sans Light" pitchFamily="34" charset="0"/>
+                          <a:ea typeface="Open Sans Light" pitchFamily="34" charset="0"/>
+                          <a:cs typeface="Open Sans Light" pitchFamily="34" charset="0"/>
+                        </a:rPr>
+                        <a:t> </a:t>
+                      </a:r>
+                      <a:r>
+                        <a:rPr lang="de-DE" baseline="0" dirty="0" err="1" smtClean="0">
+                          <a:solidFill>
+                            <a:schemeClr val="tx1">
+                              <a:lumMod val="65000"/>
+                              <a:lumOff val="35000"/>
+                            </a:schemeClr>
+                          </a:solidFill>
+                          <a:latin typeface="Open Sans Light" pitchFamily="34" charset="0"/>
+                          <a:ea typeface="Open Sans Light" pitchFamily="34" charset="0"/>
+                          <a:cs typeface="Open Sans Light" pitchFamily="34" charset="0"/>
+                        </a:rPr>
+                        <a:t>to</a:t>
+                      </a:r>
+                      <a:r>
+                        <a:rPr lang="de-DE" baseline="0" dirty="0" smtClean="0">
+                          <a:solidFill>
+                            <a:schemeClr val="tx1">
+                              <a:lumMod val="65000"/>
+                              <a:lumOff val="35000"/>
+                            </a:schemeClr>
+                          </a:solidFill>
+                          <a:latin typeface="Open Sans Light" pitchFamily="34" charset="0"/>
+                          <a:ea typeface="Open Sans Light" pitchFamily="34" charset="0"/>
+                          <a:cs typeface="Open Sans Light" pitchFamily="34" charset="0"/>
+                        </a:rPr>
+                        <a:t> </a:t>
+                      </a:r>
+                      <a:r>
+                        <a:rPr lang="de-DE" baseline="0" dirty="0" err="1" smtClean="0">
+                          <a:solidFill>
+                            <a:schemeClr val="tx1">
+                              <a:lumMod val="65000"/>
+                              <a:lumOff val="35000"/>
+                            </a:schemeClr>
+                          </a:solidFill>
+                          <a:latin typeface="Open Sans Light" pitchFamily="34" charset="0"/>
+                          <a:ea typeface="Open Sans Light" pitchFamily="34" charset="0"/>
+                          <a:cs typeface="Open Sans Light" pitchFamily="34" charset="0"/>
+                        </a:rPr>
+                        <a:t>be</a:t>
+                      </a:r>
+                      <a:r>
+                        <a:rPr lang="de-DE" baseline="0" dirty="0" smtClean="0">
+                          <a:solidFill>
+                            <a:schemeClr val="tx1">
+                              <a:lumMod val="65000"/>
+                              <a:lumOff val="35000"/>
+                            </a:schemeClr>
+                          </a:solidFill>
+                          <a:latin typeface="Open Sans Light" pitchFamily="34" charset="0"/>
+                          <a:ea typeface="Open Sans Light" pitchFamily="34" charset="0"/>
+                          <a:cs typeface="Open Sans Light" pitchFamily="34" charset="0"/>
+                        </a:rPr>
+                        <a:t> a </a:t>
+                      </a:r>
+                      <a:r>
+                        <a:rPr lang="de-DE" baseline="0" dirty="0" err="1" smtClean="0">
+                          <a:solidFill>
+                            <a:schemeClr val="tx1">
+                              <a:lumMod val="65000"/>
+                              <a:lumOff val="35000"/>
+                            </a:schemeClr>
+                          </a:solidFill>
+                          <a:latin typeface="Open Sans Light" pitchFamily="34" charset="0"/>
+                          <a:ea typeface="Open Sans Light" pitchFamily="34" charset="0"/>
+                          <a:cs typeface="Open Sans Light" pitchFamily="34" charset="0"/>
+                        </a:rPr>
+                        <a:t>Millionaire</a:t>
+                      </a:r>
+                      <a:r>
+                        <a:rPr lang="de-DE" baseline="0" dirty="0" smtClean="0">
+                          <a:solidFill>
+                            <a:schemeClr val="tx1">
+                              <a:lumMod val="65000"/>
+                              <a:lumOff val="35000"/>
+                            </a:schemeClr>
+                          </a:solidFill>
+                          <a:latin typeface="Open Sans Light" pitchFamily="34" charset="0"/>
+                          <a:ea typeface="Open Sans Light" pitchFamily="34" charset="0"/>
+                          <a:cs typeface="Open Sans Light" pitchFamily="34" charset="0"/>
+                        </a:rPr>
+                        <a:t>?</a:t>
+                      </a:r>
+                      <a:endParaRPr lang="de-DE" dirty="0">
+                        <a:solidFill>
+                          <a:schemeClr val="tx1">
+                            <a:lumMod val="65000"/>
+                            <a:lumOff val="35000"/>
+                          </a:schemeClr>
+                        </a:solidFill>
+                        <a:latin typeface="Open Sans Light" pitchFamily="34" charset="0"/>
+                        <a:ea typeface="Open Sans Light" pitchFamily="34" charset="0"/>
+                        <a:cs typeface="Open Sans Light" pitchFamily="34" charset="0"/>
+                      </a:endParaRPr>
+                    </a:p>
+                  </a:txBody>
+                  <a:tcPr>
+                    <a:lnB w="12700" cap="flat" cmpd="sng" algn="ctr">
+                      <a:solidFill>
+                        <a:schemeClr val="accent1">
+                          <a:lumMod val="50000"/>
+                        </a:schemeClr>
+                      </a:solidFill>
+                      <a:prstDash val="solid"/>
+                      <a:round/>
+                      <a:headEnd type="none" w="med" len="med"/>
+                      <a:tailEnd type="none" w="med" len="med"/>
+                    </a:lnB>
+                  </a:tcPr>
+                </a:tc>
+                <a:tc>
+                  <a:txBody>
+                    <a:bodyPr/>
+                    <a:lstStyle/>
+                    <a:p>
+                      <a:pPr algn="r"/>
+                      <a:r>
+                        <a:rPr lang="de-DE" dirty="0" smtClean="0">
+                          <a:solidFill>
+                            <a:schemeClr val="tx1">
+                              <a:lumMod val="65000"/>
+                              <a:lumOff val="35000"/>
+                            </a:schemeClr>
+                          </a:solidFill>
+                          <a:latin typeface="Open Sans Light" pitchFamily="34" charset="0"/>
+                          <a:ea typeface="Open Sans Light" pitchFamily="34" charset="0"/>
+                          <a:cs typeface="Open Sans Light" pitchFamily="34" charset="0"/>
+                        </a:rPr>
+                        <a:t>Teil:</a:t>
+                      </a:r>
+                      <a:r>
+                        <a:rPr lang="de-DE" baseline="0" dirty="0" smtClean="0">
+                          <a:solidFill>
+                            <a:schemeClr val="tx1">
+                              <a:lumMod val="65000"/>
+                              <a:lumOff val="35000"/>
+                            </a:schemeClr>
+                          </a:solidFill>
+                          <a:latin typeface="Open Sans Light" pitchFamily="34" charset="0"/>
+                          <a:ea typeface="Open Sans Light" pitchFamily="34" charset="0"/>
+                          <a:cs typeface="Open Sans Light" pitchFamily="34" charset="0"/>
+                        </a:rPr>
+                        <a:t> Nicht Funktionale Anforderungen</a:t>
+                      </a:r>
+                      <a:endParaRPr lang="de-DE" dirty="0">
+                        <a:solidFill>
+                          <a:schemeClr val="tx1">
+                            <a:lumMod val="65000"/>
+                            <a:lumOff val="35000"/>
+                          </a:schemeClr>
+                        </a:solidFill>
+                        <a:latin typeface="Open Sans Light" pitchFamily="34" charset="0"/>
+                        <a:ea typeface="Open Sans Light" pitchFamily="34" charset="0"/>
+                        <a:cs typeface="Open Sans Light" pitchFamily="34" charset="0"/>
+                      </a:endParaRPr>
+                    </a:p>
+                  </a:txBody>
+                  <a:tcPr>
+                    <a:lnB w="12700" cap="flat" cmpd="sng" algn="ctr">
+                      <a:solidFill>
+                        <a:schemeClr val="accent1">
+                          <a:lumMod val="50000"/>
+                        </a:schemeClr>
+                      </a:solidFill>
+                      <a:prstDash val="solid"/>
+                      <a:round/>
+                      <a:headEnd type="none" w="med" len="med"/>
+                      <a:tailEnd type="none" w="med" len="med"/>
+                    </a:lnB>
+                  </a:tcPr>
+                </a:tc>
+              </a:tr>
+            </a:tbl>
+          </a:graphicData>
+        </a:graphic>
+      </p:graphicFrame>
+      <p:sp>
+        <p:nvSpPr>
+          <p:cNvPr id="15" name="Textfeld 14"/>
+          <p:cNvSpPr txBox="1"/>
+          <p:nvPr/>
+        </p:nvSpPr>
+        <p:spPr>
+          <a:xfrm>
+            <a:off x="1115616" y="980728"/>
+            <a:ext cx="8028384" cy="584775"/>
+          </a:xfrm>
+          <a:prstGeom prst="rect">
+            <a:avLst/>
+          </a:prstGeom>
+          <a:noFill/>
+        </p:spPr>
+        <p:txBody>
+          <a:bodyPr wrap="square" rtlCol="0">
+            <a:spAutoFit/>
+          </a:bodyPr>
+          <a:lstStyle/>
+          <a:p>
+            <a:r>
+              <a:rPr lang="de-DE" sz="3200" dirty="0" smtClean="0">
+                <a:latin typeface="Open Sans Light" pitchFamily="34" charset="0"/>
+                <a:ea typeface="Open Sans Light" pitchFamily="34" charset="0"/>
+                <a:cs typeface="Open Sans Light" pitchFamily="34" charset="0"/>
+              </a:rPr>
+              <a:t>VORGEGEBENE NFRs</a:t>
+            </a:r>
+            <a:endParaRPr lang="de-DE" sz="3200" dirty="0">
+              <a:latin typeface="Open Sans Light" pitchFamily="34" charset="0"/>
+              <a:ea typeface="Open Sans Light" pitchFamily="34" charset="0"/>
+              <a:cs typeface="Open Sans Light" pitchFamily="34" charset="0"/>
+            </a:endParaRPr>
+          </a:p>
+        </p:txBody>
+      </p:sp>
+      <p:sp>
+        <p:nvSpPr>
+          <p:cNvPr id="9" name="Textfeld 8"/>
+          <p:cNvSpPr txBox="1"/>
+          <p:nvPr/>
+        </p:nvSpPr>
+        <p:spPr>
+          <a:xfrm>
+            <a:off x="323528" y="2204864"/>
+            <a:ext cx="8280920" cy="3416320"/>
+          </a:xfrm>
+          <a:prstGeom prst="rect">
+            <a:avLst/>
+          </a:prstGeom>
+          <a:noFill/>
+        </p:spPr>
+        <p:txBody>
+          <a:bodyPr wrap="square" rtlCol="0">
+            <a:spAutoFit/>
+          </a:bodyPr>
+          <a:lstStyle/>
+          <a:p>
+            <a:pPr>
+              <a:lnSpc>
+                <a:spcPct val="150000"/>
+              </a:lnSpc>
+              <a:buFont typeface="Courier New" pitchFamily="49" charset="0"/>
+              <a:buChar char="o"/>
+            </a:pPr>
+            <a:r>
+              <a:rPr lang="de-DE" dirty="0"/>
+              <a:t> </a:t>
+            </a:r>
+            <a:r>
+              <a:rPr lang="de-DE" dirty="0" smtClean="0">
+                <a:solidFill>
+                  <a:schemeClr val="tx1">
+                    <a:lumMod val="95000"/>
+                    <a:lumOff val="5000"/>
+                  </a:schemeClr>
+                </a:solidFill>
+                <a:latin typeface="Open Sans" pitchFamily="34" charset="0"/>
+                <a:ea typeface="Open Sans" pitchFamily="34" charset="0"/>
+                <a:cs typeface="Open Sans" pitchFamily="34" charset="0"/>
+              </a:rPr>
+              <a:t>Die Implementierung soll in Java erfolgen inklusive der Oberflächen mit dem Swing-</a:t>
+            </a:r>
+            <a:r>
+              <a:rPr lang="de-DE" dirty="0" err="1" smtClean="0">
+                <a:solidFill>
+                  <a:schemeClr val="tx1">
+                    <a:lumMod val="95000"/>
+                    <a:lumOff val="5000"/>
+                  </a:schemeClr>
+                </a:solidFill>
+                <a:latin typeface="Open Sans" pitchFamily="34" charset="0"/>
+                <a:ea typeface="Open Sans" pitchFamily="34" charset="0"/>
+                <a:cs typeface="Open Sans" pitchFamily="34" charset="0"/>
+              </a:rPr>
+              <a:t>Toolkit</a:t>
+            </a:r>
+            <a:r>
+              <a:rPr lang="de-DE" dirty="0" smtClean="0">
+                <a:solidFill>
+                  <a:schemeClr val="tx1">
+                    <a:lumMod val="95000"/>
+                    <a:lumOff val="5000"/>
+                  </a:schemeClr>
+                </a:solidFill>
+                <a:latin typeface="Open Sans" pitchFamily="34" charset="0"/>
+                <a:ea typeface="Open Sans" pitchFamily="34" charset="0"/>
+                <a:cs typeface="Open Sans" pitchFamily="34" charset="0"/>
+              </a:rPr>
+              <a:t>.</a:t>
+            </a:r>
+          </a:p>
+          <a:p>
+            <a:pPr>
+              <a:lnSpc>
+                <a:spcPct val="150000"/>
+              </a:lnSpc>
+              <a:buFont typeface="Courier New" pitchFamily="49" charset="0"/>
+              <a:buChar char="o"/>
+            </a:pPr>
+            <a:r>
+              <a:rPr lang="de-DE" dirty="0">
+                <a:solidFill>
+                  <a:schemeClr val="tx1">
+                    <a:lumMod val="95000"/>
+                    <a:lumOff val="5000"/>
+                  </a:schemeClr>
+                </a:solidFill>
+                <a:latin typeface="Open Sans" pitchFamily="34" charset="0"/>
+                <a:ea typeface="Open Sans" pitchFamily="34" charset="0"/>
+                <a:cs typeface="Open Sans" pitchFamily="34" charset="0"/>
+              </a:rPr>
+              <a:t> </a:t>
+            </a:r>
+            <a:r>
+              <a:rPr lang="de-DE" dirty="0" smtClean="0">
+                <a:solidFill>
+                  <a:schemeClr val="tx1">
+                    <a:lumMod val="95000"/>
+                    <a:lumOff val="5000"/>
+                  </a:schemeClr>
+                </a:solidFill>
+                <a:latin typeface="Open Sans" pitchFamily="34" charset="0"/>
+                <a:ea typeface="Open Sans" pitchFamily="34" charset="0"/>
+                <a:cs typeface="Open Sans" pitchFamily="34" charset="0"/>
+              </a:rPr>
+              <a:t> Der Source-Code soll mit </a:t>
+            </a:r>
+            <a:r>
+              <a:rPr lang="de-DE" dirty="0" err="1" smtClean="0">
+                <a:solidFill>
+                  <a:schemeClr val="tx1">
+                    <a:lumMod val="95000"/>
+                    <a:lumOff val="5000"/>
+                  </a:schemeClr>
+                </a:solidFill>
+                <a:latin typeface="Open Sans" pitchFamily="34" charset="0"/>
+                <a:ea typeface="Open Sans" pitchFamily="34" charset="0"/>
+                <a:cs typeface="Open Sans" pitchFamily="34" charset="0"/>
+              </a:rPr>
+              <a:t>JavaDoc</a:t>
+            </a:r>
+            <a:r>
+              <a:rPr lang="de-DE" dirty="0" smtClean="0">
+                <a:solidFill>
+                  <a:schemeClr val="tx1">
+                    <a:lumMod val="95000"/>
+                    <a:lumOff val="5000"/>
+                  </a:schemeClr>
+                </a:solidFill>
+                <a:latin typeface="Open Sans" pitchFamily="34" charset="0"/>
+                <a:ea typeface="Open Sans" pitchFamily="34" charset="0"/>
+                <a:cs typeface="Open Sans" pitchFamily="34" charset="0"/>
+              </a:rPr>
+              <a:t> kommentiert werden.</a:t>
+            </a:r>
+          </a:p>
+          <a:p>
+            <a:pPr>
+              <a:lnSpc>
+                <a:spcPct val="150000"/>
+              </a:lnSpc>
+              <a:buFont typeface="Courier New" pitchFamily="49" charset="0"/>
+              <a:buChar char="o"/>
+            </a:pPr>
+            <a:r>
+              <a:rPr lang="de-DE" dirty="0">
+                <a:solidFill>
+                  <a:schemeClr val="tx1">
+                    <a:lumMod val="95000"/>
+                    <a:lumOff val="5000"/>
+                  </a:schemeClr>
+                </a:solidFill>
+                <a:latin typeface="Open Sans" pitchFamily="34" charset="0"/>
+                <a:ea typeface="Open Sans" pitchFamily="34" charset="0"/>
+                <a:cs typeface="Open Sans" pitchFamily="34" charset="0"/>
+              </a:rPr>
+              <a:t> </a:t>
+            </a:r>
+            <a:r>
+              <a:rPr lang="de-DE" dirty="0" smtClean="0">
+                <a:solidFill>
+                  <a:schemeClr val="tx1">
+                    <a:lumMod val="95000"/>
+                    <a:lumOff val="5000"/>
+                  </a:schemeClr>
+                </a:solidFill>
+                <a:latin typeface="Open Sans" pitchFamily="34" charset="0"/>
+                <a:ea typeface="Open Sans" pitchFamily="34" charset="0"/>
+                <a:cs typeface="Open Sans" pitchFamily="34" charset="0"/>
+              </a:rPr>
+              <a:t>Das System soll mittels mehreren Klassen organisiert sein</a:t>
+            </a:r>
+          </a:p>
+          <a:p>
+            <a:pPr>
+              <a:lnSpc>
+                <a:spcPct val="150000"/>
+              </a:lnSpc>
+              <a:buFont typeface="Courier New" pitchFamily="49" charset="0"/>
+              <a:buChar char="o"/>
+            </a:pPr>
+            <a:r>
+              <a:rPr lang="de-DE" dirty="0">
+                <a:solidFill>
+                  <a:schemeClr val="tx1">
+                    <a:lumMod val="95000"/>
+                    <a:lumOff val="5000"/>
+                  </a:schemeClr>
+                </a:solidFill>
+                <a:latin typeface="Open Sans" pitchFamily="34" charset="0"/>
+                <a:ea typeface="Open Sans" pitchFamily="34" charset="0"/>
+                <a:cs typeface="Open Sans" pitchFamily="34" charset="0"/>
+              </a:rPr>
+              <a:t> </a:t>
+            </a:r>
+            <a:r>
+              <a:rPr lang="de-DE" dirty="0" smtClean="0">
+                <a:solidFill>
+                  <a:schemeClr val="tx1">
+                    <a:lumMod val="95000"/>
+                    <a:lumOff val="5000"/>
+                  </a:schemeClr>
+                </a:solidFill>
+                <a:latin typeface="Open Sans" pitchFamily="34" charset="0"/>
+                <a:ea typeface="Open Sans" pitchFamily="34" charset="0"/>
+                <a:cs typeface="Open Sans" pitchFamily="34" charset="0"/>
+              </a:rPr>
+              <a:t>J-Unit Tests für alle Methoden inklusive der Entwicklung von Test-Prozeduren </a:t>
+            </a:r>
+          </a:p>
+          <a:p>
+            <a:pPr>
+              <a:lnSpc>
+                <a:spcPct val="150000"/>
+              </a:lnSpc>
+              <a:buFont typeface="Courier New" pitchFamily="49" charset="0"/>
+              <a:buChar char="o"/>
+            </a:pPr>
+            <a:r>
+              <a:rPr lang="de-DE" dirty="0">
+                <a:solidFill>
+                  <a:schemeClr val="tx1">
+                    <a:lumMod val="95000"/>
+                    <a:lumOff val="5000"/>
+                  </a:schemeClr>
+                </a:solidFill>
+                <a:latin typeface="Open Sans" pitchFamily="34" charset="0"/>
+                <a:ea typeface="Open Sans" pitchFamily="34" charset="0"/>
+                <a:cs typeface="Open Sans" pitchFamily="34" charset="0"/>
+              </a:rPr>
+              <a:t> </a:t>
+            </a:r>
+            <a:r>
+              <a:rPr lang="de-DE" dirty="0" smtClean="0">
+                <a:solidFill>
+                  <a:schemeClr val="tx1">
+                    <a:lumMod val="95000"/>
+                    <a:lumOff val="5000"/>
+                  </a:schemeClr>
+                </a:solidFill>
+                <a:latin typeface="Open Sans" pitchFamily="34" charset="0"/>
+                <a:ea typeface="Open Sans" pitchFamily="34" charset="0"/>
+                <a:cs typeface="Open Sans" pitchFamily="34" charset="0"/>
+              </a:rPr>
+              <a:t>Ausnahmen müssen behandelt werden</a:t>
+            </a:r>
+          </a:p>
+          <a:p>
+            <a:pPr>
+              <a:lnSpc>
+                <a:spcPct val="150000"/>
+              </a:lnSpc>
+              <a:buFont typeface="Courier New" pitchFamily="49" charset="0"/>
+              <a:buChar char="o"/>
+            </a:pPr>
+            <a:r>
+              <a:rPr lang="de-DE" dirty="0">
+                <a:solidFill>
+                  <a:schemeClr val="tx1">
+                    <a:lumMod val="95000"/>
+                    <a:lumOff val="5000"/>
+                  </a:schemeClr>
+                </a:solidFill>
+                <a:latin typeface="Open Sans" pitchFamily="34" charset="0"/>
+                <a:ea typeface="Open Sans" pitchFamily="34" charset="0"/>
+                <a:cs typeface="Open Sans" pitchFamily="34" charset="0"/>
+              </a:rPr>
+              <a:t> </a:t>
+            </a:r>
+            <a:r>
+              <a:rPr lang="de-DE" dirty="0" smtClean="0">
+                <a:solidFill>
+                  <a:schemeClr val="tx1">
+                    <a:lumMod val="95000"/>
+                    <a:lumOff val="5000"/>
+                  </a:schemeClr>
+                </a:solidFill>
+                <a:latin typeface="Open Sans" pitchFamily="34" charset="0"/>
+                <a:ea typeface="Open Sans" pitchFamily="34" charset="0"/>
+                <a:cs typeface="Open Sans" pitchFamily="34" charset="0"/>
+              </a:rPr>
+              <a:t>„Fatale“ Benutzerinteraktionen sollen mittels Dialog abgefragt werden.</a:t>
+            </a:r>
+          </a:p>
+        </p:txBody>
+      </p:sp>
+      <p:pic>
+        <p:nvPicPr>
+          <p:cNvPr id="15362" name="Picture 2"/>
+          <p:cNvPicPr>
+            <a:picLocks noChangeAspect="1" noChangeArrowheads="1"/>
+          </p:cNvPicPr>
+          <p:nvPr/>
+        </p:nvPicPr>
+        <p:blipFill>
+          <a:blip r:embed="rId3" cstate="print"/>
+          <a:srcRect/>
+          <a:stretch>
+            <a:fillRect/>
+          </a:stretch>
+        </p:blipFill>
+        <p:spPr bwMode="auto">
+          <a:xfrm>
+            <a:off x="251520" y="908720"/>
+            <a:ext cx="757215" cy="656253"/>
+          </a:xfrm>
+          <a:prstGeom prst="rect">
+            <a:avLst/>
+          </a:prstGeom>
+          <a:noFill/>
+          <a:ln w="9525">
+            <a:noFill/>
+            <a:miter lim="800000"/>
+            <a:headEnd/>
+            <a:tailEnd/>
+          </a:ln>
+          <a:effectLst/>
+        </p:spPr>
+      </p:pic>
+    </p:spTree>
+  </p:cSld>
+  <p:clrMapOvr>
+    <a:masterClrMapping/>
+  </p:clrMapOvr>
+  <p:timing>
+    <p:tnLst>
+      <p:par>
+        <p:cTn id="1" dur="indefinite" restart="never" nodeType="tmRoot"/>
+      </p:par>
+    </p:tnLst>
+  </p:timing>
+</p:sld>
+</file>
+
 <file path=ppt/slides/slide3.xml><?xml version="1.0" encoding="utf-8"?>
 <p:sld xmlns:a="http://schemas.openxmlformats.org/drawingml/2006/main" xmlns:r="http://schemas.openxmlformats.org/officeDocument/2006/relationships" xmlns:p="http://schemas.openxmlformats.org/presentationml/2006/main">
   <p:cSld>
@@ -23445,7 +25994,7 @@
         <p:spPr>
           <a:xfrm>
             <a:off x="467544" y="2060848"/>
-            <a:ext cx="8424936" cy="1938992"/>
+            <a:ext cx="8424936" cy="4339650"/>
           </a:xfrm>
           <a:prstGeom prst="rect">
             <a:avLst/>
@@ -23477,7 +26026,7 @@
                 <a:ea typeface="Open Sans Light" pitchFamily="34" charset="0"/>
                 <a:cs typeface="Open Sans Light" pitchFamily="34" charset="0"/>
               </a:rPr>
-              <a:t> Erweiterte Funktionen</a:t>
+              <a:t> Erweiterte Funktionalität</a:t>
             </a:r>
           </a:p>
           <a:p>
@@ -23488,6 +26037,126 @@
               <a:buFontTx/>
               <a:buChar char="-"/>
             </a:pPr>
+            <a:r>
+              <a:rPr lang="de-DE" sz="2400" dirty="0" smtClean="0">
+                <a:solidFill>
+                  <a:schemeClr val="tx1">
+                    <a:lumMod val="85000"/>
+                    <a:lumOff val="15000"/>
+                  </a:schemeClr>
+                </a:solidFill>
+                <a:latin typeface="Open Sans Light" pitchFamily="34" charset="0"/>
+                <a:ea typeface="Open Sans Light" pitchFamily="34" charset="0"/>
+                <a:cs typeface="Open Sans Light" pitchFamily="34" charset="0"/>
+              </a:rPr>
+              <a:t>Fragenkatalog in einer Datenbank</a:t>
+            </a:r>
+          </a:p>
+          <a:p>
+            <a:pPr lvl="1">
+              <a:lnSpc>
+                <a:spcPct val="150000"/>
+              </a:lnSpc>
+              <a:buFontTx/>
+              <a:buChar char="-"/>
+            </a:pPr>
+            <a:r>
+              <a:rPr lang="de-DE" sz="2400" dirty="0" err="1" smtClean="0">
+                <a:solidFill>
+                  <a:schemeClr val="tx1">
+                    <a:lumMod val="85000"/>
+                    <a:lumOff val="15000"/>
+                  </a:schemeClr>
+                </a:solidFill>
+                <a:latin typeface="Open Sans Light" pitchFamily="34" charset="0"/>
+                <a:ea typeface="Open Sans Light" pitchFamily="34" charset="0"/>
+                <a:cs typeface="Open Sans Light" pitchFamily="34" charset="0"/>
+              </a:rPr>
+              <a:t>Highscore</a:t>
+            </a:r>
+            <a:r>
+              <a:rPr lang="de-DE" sz="2400" dirty="0" smtClean="0">
+                <a:solidFill>
+                  <a:schemeClr val="tx1">
+                    <a:lumMod val="85000"/>
+                    <a:lumOff val="15000"/>
+                  </a:schemeClr>
+                </a:solidFill>
+                <a:latin typeface="Open Sans Light" pitchFamily="34" charset="0"/>
+                <a:ea typeface="Open Sans Light" pitchFamily="34" charset="0"/>
+                <a:cs typeface="Open Sans Light" pitchFamily="34" charset="0"/>
+              </a:rPr>
+              <a:t> Verwaltung</a:t>
+            </a:r>
+          </a:p>
+          <a:p>
+            <a:pPr>
+              <a:lnSpc>
+                <a:spcPct val="150000"/>
+              </a:lnSpc>
+              <a:buFont typeface="Courier New" pitchFamily="49" charset="0"/>
+              <a:buChar char="o"/>
+            </a:pPr>
+            <a:r>
+              <a:rPr lang="de-DE" sz="2800" dirty="0" smtClean="0">
+                <a:solidFill>
+                  <a:schemeClr val="tx1">
+                    <a:lumMod val="85000"/>
+                    <a:lumOff val="15000"/>
+                  </a:schemeClr>
+                </a:solidFill>
+                <a:latin typeface="Open Sans Light" pitchFamily="34" charset="0"/>
+                <a:ea typeface="Open Sans Light" pitchFamily="34" charset="0"/>
+                <a:cs typeface="Open Sans Light" pitchFamily="34" charset="0"/>
+              </a:rPr>
+              <a:t> Nicht Funktionale Anforderungen</a:t>
+            </a:r>
+          </a:p>
+          <a:p>
+            <a:pPr lvl="1">
+              <a:lnSpc>
+                <a:spcPct val="150000"/>
+              </a:lnSpc>
+              <a:buFontTx/>
+              <a:buChar char="-"/>
+            </a:pPr>
+            <a:r>
+              <a:rPr lang="de-DE" sz="2400" dirty="0" smtClean="0">
+                <a:solidFill>
+                  <a:schemeClr val="tx1">
+                    <a:lumMod val="85000"/>
+                    <a:lumOff val="15000"/>
+                  </a:schemeClr>
+                </a:solidFill>
+                <a:latin typeface="Open Sans Light" pitchFamily="34" charset="0"/>
+                <a:ea typeface="Open Sans Light" pitchFamily="34" charset="0"/>
+                <a:cs typeface="Open Sans Light" pitchFamily="34" charset="0"/>
+              </a:rPr>
+              <a:t> Vorgegebene NFRs</a:t>
+            </a:r>
+          </a:p>
+          <a:p>
+            <a:pPr lvl="1">
+              <a:lnSpc>
+                <a:spcPct val="150000"/>
+              </a:lnSpc>
+              <a:buFontTx/>
+              <a:buChar char="-"/>
+            </a:pPr>
+            <a:r>
+              <a:rPr lang="de-DE" sz="2400" dirty="0" smtClean="0">
+                <a:solidFill>
+                  <a:schemeClr val="tx1">
+                    <a:lumMod val="85000"/>
+                    <a:lumOff val="15000"/>
+                  </a:schemeClr>
+                </a:solidFill>
+                <a:latin typeface="Open Sans Light" pitchFamily="34" charset="0"/>
+                <a:ea typeface="Open Sans Light" pitchFamily="34" charset="0"/>
+                <a:cs typeface="Open Sans Light" pitchFamily="34" charset="0"/>
+              </a:rPr>
+              <a:t> Zu erstellende Artefakte</a:t>
+            </a:r>
             <a:r>
               <a:rPr lang="de-DE" sz="2800" dirty="0" smtClean="0">
                 <a:solidFill>
@@ -23525,6 +26194,873 @@
           </a:p>
         </p:txBody>
       </p:sp>
+    </p:spTree>
+  </p:cSld>
+  <p:clrMapOvr>
+    <a:masterClrMapping/>
+  </p:clrMapOvr>
+  <p:timing>
+    <p:tnLst>
+      <p:par>
+        <p:cTn id="1" dur="indefinite" restart="never" nodeType="tmRoot"/>
+      </p:par>
+    </p:tnLst>
+  </p:timing>
+</p:sld>
+</file>
+
+<file path=ppt/slides/slide30.xml><?xml version="1.0" encoding="utf-8"?>
+<p:sld xmlns:a="http://schemas.openxmlformats.org/drawingml/2006/main" xmlns:r="http://schemas.openxmlformats.org/officeDocument/2006/relationships" xmlns:p="http://schemas.openxmlformats.org/presentationml/2006/main">
+  <p:cSld>
+    <p:spTree>
+      <p:nvGrpSpPr>
+        <p:cNvPr id="1" name=""/>
+        <p:cNvGrpSpPr/>
+        <p:nvPr/>
+      </p:nvGrpSpPr>
+      <p:grpSpPr>
+        <a:xfrm>
+          <a:off x="0" y="0"/>
+          <a:ext cx="0" cy="0"/>
+          <a:chOff x="0" y="0"/>
+          <a:chExt cx="0" cy="0"/>
+        </a:xfrm>
+      </p:grpSpPr>
+      <p:graphicFrame>
+        <p:nvGraphicFramePr>
+          <p:cNvPr id="8" name="Tabelle 7"/>
+          <p:cNvGraphicFramePr>
+            <a:graphicFrameLocks noGrp="1"/>
+          </p:cNvGraphicFramePr>
+          <p:nvPr/>
+        </p:nvGraphicFramePr>
+        <p:xfrm>
+          <a:off x="251520" y="6309320"/>
+          <a:ext cx="8640960" cy="370840"/>
+        </p:xfrm>
+        <a:graphic>
+          <a:graphicData uri="http://schemas.openxmlformats.org/drawingml/2006/table">
+            <a:tbl>
+              <a:tblPr firstRow="1" bandRow="1">
+                <a:tableStyleId>{2D5ABB26-0587-4C30-8999-92F81FD0307C}</a:tableStyleId>
+              </a:tblPr>
+              <a:tblGrid>
+                <a:gridCol w="4320480"/>
+                <a:gridCol w="4320480"/>
+              </a:tblGrid>
+              <a:tr h="370840">
+                <a:tc>
+                  <a:txBody>
+                    <a:bodyPr/>
+                    <a:lstStyle/>
+                    <a:p>
+                      <a:r>
+                        <a:rPr lang="de-DE" sz="1600" dirty="0" smtClean="0">
+                          <a:solidFill>
+                            <a:schemeClr val="accent1">
+                              <a:lumMod val="75000"/>
+                            </a:schemeClr>
+                          </a:solidFill>
+                          <a:latin typeface="Open Sans" pitchFamily="34" charset="0"/>
+                          <a:ea typeface="Open Sans" pitchFamily="34" charset="0"/>
+                          <a:cs typeface="Open Sans" pitchFamily="34" charset="0"/>
+                        </a:rPr>
+                        <a:t>Gruppe: Millionär // SS2016 // OOT</a:t>
+                      </a:r>
+                      <a:endParaRPr lang="de-DE" sz="1600" dirty="0">
+                        <a:solidFill>
+                          <a:schemeClr val="accent1">
+                            <a:lumMod val="75000"/>
+                          </a:schemeClr>
+                        </a:solidFill>
+                        <a:latin typeface="Open Sans" pitchFamily="34" charset="0"/>
+                        <a:ea typeface="Open Sans" pitchFamily="34" charset="0"/>
+                        <a:cs typeface="Open Sans" pitchFamily="34" charset="0"/>
+                      </a:endParaRPr>
+                    </a:p>
+                  </a:txBody>
+                  <a:tcPr>
+                    <a:lnL w="12700" cap="flat" cmpd="sng" algn="ctr">
+                      <a:noFill/>
+                      <a:prstDash val="solid"/>
+                      <a:round/>
+                      <a:headEnd type="none" w="med" len="med"/>
+                      <a:tailEnd type="none" w="med" len="med"/>
+                    </a:lnL>
+                    <a:lnR w="12700" cap="flat" cmpd="sng" algn="ctr">
+                      <a:noFill/>
+                      <a:prstDash val="solid"/>
+                      <a:round/>
+                      <a:headEnd type="none" w="med" len="med"/>
+                      <a:tailEnd type="none" w="med" len="med"/>
+                    </a:lnR>
+                    <a:lnT w="12700" cap="flat" cmpd="sng" algn="ctr">
+                      <a:solidFill>
+                        <a:schemeClr val="accent1">
+                          <a:lumMod val="50000"/>
+                        </a:schemeClr>
+                      </a:solidFill>
+                      <a:prstDash val="solid"/>
+                      <a:round/>
+                      <a:headEnd type="none" w="med" len="med"/>
+                      <a:tailEnd type="none" w="med" len="med"/>
+                    </a:lnT>
+                    <a:lnB w="12700" cap="flat" cmpd="sng" algn="ctr">
+                      <a:noFill/>
+                      <a:prstDash val="solid"/>
+                      <a:round/>
+                      <a:headEnd type="none" w="med" len="med"/>
+                      <a:tailEnd type="none" w="med" len="med"/>
+                    </a:lnB>
+                    <a:lnTlToBr w="12700" cmpd="sng">
+                      <a:noFill/>
+                      <a:prstDash val="solid"/>
+                    </a:lnTlToBr>
+                    <a:lnBlToTr w="12700" cmpd="sng">
+                      <a:noFill/>
+                      <a:prstDash val="solid"/>
+                    </a:lnBlToTr>
+                  </a:tcPr>
+                </a:tc>
+                <a:tc>
+                  <a:txBody>
+                    <a:bodyPr/>
+                    <a:lstStyle/>
+                    <a:p>
+                      <a:pPr algn="r"/>
+                      <a:r>
+                        <a:rPr lang="de-DE" sz="1600" dirty="0" smtClean="0">
+                          <a:solidFill>
+                            <a:schemeClr val="accent1">
+                              <a:lumMod val="75000"/>
+                            </a:schemeClr>
+                          </a:solidFill>
+                          <a:latin typeface="Open Sans" pitchFamily="34" charset="0"/>
+                          <a:ea typeface="Open Sans" pitchFamily="34" charset="0"/>
+                          <a:cs typeface="Open Sans" pitchFamily="34" charset="0"/>
+                        </a:rPr>
+                        <a:t>Folie: </a:t>
+                      </a:r>
+                      <a:fld id="{328F9375-978F-43FF-828F-1CDC57A20BD8}" type="slidenum">
+                        <a:rPr lang="de-DE" sz="1600" smtClean="0">
+                          <a:solidFill>
+                            <a:schemeClr val="accent1">
+                              <a:lumMod val="75000"/>
+                            </a:schemeClr>
+                          </a:solidFill>
+                          <a:latin typeface="Open Sans" pitchFamily="34" charset="0"/>
+                          <a:ea typeface="Open Sans" pitchFamily="34" charset="0"/>
+                          <a:cs typeface="Open Sans" pitchFamily="34" charset="0"/>
+                        </a:rPr>
+                        <a:t>30</a:t>
+                      </a:fld>
+                      <a:endParaRPr lang="de-DE" sz="1600" dirty="0">
+                        <a:solidFill>
+                          <a:schemeClr val="accent1">
+                            <a:lumMod val="75000"/>
+                          </a:schemeClr>
+                        </a:solidFill>
+                        <a:latin typeface="Open Sans" pitchFamily="34" charset="0"/>
+                        <a:ea typeface="Open Sans" pitchFamily="34" charset="0"/>
+                        <a:cs typeface="Open Sans" pitchFamily="34" charset="0"/>
+                      </a:endParaRPr>
+                    </a:p>
+                  </a:txBody>
+                  <a:tcPr>
+                    <a:lnL w="12700" cap="flat" cmpd="sng" algn="ctr">
+                      <a:noFill/>
+                      <a:prstDash val="solid"/>
+                      <a:round/>
+                      <a:headEnd type="none" w="med" len="med"/>
+                      <a:tailEnd type="none" w="med" len="med"/>
+                    </a:lnL>
+                    <a:lnR w="12700" cap="flat" cmpd="sng" algn="ctr">
+                      <a:noFill/>
+                      <a:prstDash val="solid"/>
+                      <a:round/>
+                      <a:headEnd type="none" w="med" len="med"/>
+                      <a:tailEnd type="none" w="med" len="med"/>
+                    </a:lnR>
+                    <a:lnT w="12700" cap="flat" cmpd="sng" algn="ctr">
+                      <a:solidFill>
+                        <a:schemeClr val="accent1">
+                          <a:lumMod val="50000"/>
+                        </a:schemeClr>
+                      </a:solidFill>
+                      <a:prstDash val="solid"/>
+                      <a:round/>
+                      <a:headEnd type="none" w="med" len="med"/>
+                      <a:tailEnd type="none" w="med" len="med"/>
+                    </a:lnT>
+                    <a:lnB w="12700" cap="flat" cmpd="sng" algn="ctr">
+                      <a:noFill/>
+                      <a:prstDash val="solid"/>
+                      <a:round/>
+                      <a:headEnd type="none" w="med" len="med"/>
+                      <a:tailEnd type="none" w="med" len="med"/>
+                    </a:lnB>
+                    <a:lnTlToBr w="12700" cmpd="sng">
+                      <a:noFill/>
+                      <a:prstDash val="solid"/>
+                    </a:lnTlToBr>
+                    <a:lnBlToTr w="12700" cmpd="sng">
+                      <a:noFill/>
+                      <a:prstDash val="solid"/>
+                    </a:lnBlToTr>
+                  </a:tcPr>
+                </a:tc>
+              </a:tr>
+            </a:tbl>
+          </a:graphicData>
+        </a:graphic>
+      </p:graphicFrame>
+      <p:graphicFrame>
+        <p:nvGraphicFramePr>
+          <p:cNvPr id="6" name="Tabelle 5"/>
+          <p:cNvGraphicFramePr>
+            <a:graphicFrameLocks noGrp="1"/>
+          </p:cNvGraphicFramePr>
+          <p:nvPr/>
+        </p:nvGraphicFramePr>
+        <p:xfrm>
+          <a:off x="395536" y="188640"/>
+          <a:ext cx="8496944" cy="370840"/>
+        </p:xfrm>
+        <a:graphic>
+          <a:graphicData uri="http://schemas.openxmlformats.org/drawingml/2006/table">
+            <a:tbl>
+              <a:tblPr firstRow="1" bandRow="1">
+                <a:tableStyleId>{2D5ABB26-0587-4C30-8999-92F81FD0307C}</a:tableStyleId>
+              </a:tblPr>
+              <a:tblGrid>
+                <a:gridCol w="4248472"/>
+                <a:gridCol w="4248472"/>
+              </a:tblGrid>
+              <a:tr h="370840">
+                <a:tc>
+                  <a:txBody>
+                    <a:bodyPr/>
+                    <a:lstStyle/>
+                    <a:p>
+                      <a:r>
+                        <a:rPr lang="de-DE" dirty="0" smtClean="0">
+                          <a:solidFill>
+                            <a:schemeClr val="tx1">
+                              <a:lumMod val="65000"/>
+                              <a:lumOff val="35000"/>
+                            </a:schemeClr>
+                          </a:solidFill>
+                          <a:latin typeface="Open Sans Light" pitchFamily="34" charset="0"/>
+                          <a:ea typeface="Open Sans Light" pitchFamily="34" charset="0"/>
+                          <a:cs typeface="Open Sans Light" pitchFamily="34" charset="0"/>
+                        </a:rPr>
+                        <a:t>Projekt:</a:t>
+                      </a:r>
+                      <a:r>
+                        <a:rPr lang="de-DE" baseline="0" dirty="0" smtClean="0">
+                          <a:solidFill>
+                            <a:schemeClr val="tx1">
+                              <a:lumMod val="65000"/>
+                              <a:lumOff val="35000"/>
+                            </a:schemeClr>
+                          </a:solidFill>
+                          <a:latin typeface="Open Sans Light" pitchFamily="34" charset="0"/>
+                          <a:ea typeface="Open Sans Light" pitchFamily="34" charset="0"/>
+                          <a:cs typeface="Open Sans Light" pitchFamily="34" charset="0"/>
+                        </a:rPr>
+                        <a:t> </a:t>
+                      </a:r>
+                      <a:r>
+                        <a:rPr lang="de-DE" dirty="0" smtClean="0">
+                          <a:solidFill>
+                            <a:schemeClr val="tx1">
+                              <a:lumMod val="65000"/>
+                              <a:lumOff val="35000"/>
+                            </a:schemeClr>
+                          </a:solidFill>
+                          <a:latin typeface="Open Sans Light" pitchFamily="34" charset="0"/>
+                          <a:ea typeface="Open Sans Light" pitchFamily="34" charset="0"/>
+                          <a:cs typeface="Open Sans Light" pitchFamily="34" charset="0"/>
+                        </a:rPr>
+                        <a:t>Who </a:t>
+                      </a:r>
+                      <a:r>
+                        <a:rPr lang="de-DE" dirty="0" err="1" smtClean="0">
+                          <a:solidFill>
+                            <a:schemeClr val="tx1">
+                              <a:lumMod val="65000"/>
+                              <a:lumOff val="35000"/>
+                            </a:schemeClr>
+                          </a:solidFill>
+                          <a:latin typeface="Open Sans Light" pitchFamily="34" charset="0"/>
+                          <a:ea typeface="Open Sans Light" pitchFamily="34" charset="0"/>
+                          <a:cs typeface="Open Sans Light" pitchFamily="34" charset="0"/>
+                        </a:rPr>
+                        <a:t>Wants</a:t>
+                      </a:r>
+                      <a:r>
+                        <a:rPr lang="de-DE" baseline="0" dirty="0" smtClean="0">
+                          <a:solidFill>
+                            <a:schemeClr val="tx1">
+                              <a:lumMod val="65000"/>
+                              <a:lumOff val="35000"/>
+                            </a:schemeClr>
+                          </a:solidFill>
+                          <a:latin typeface="Open Sans Light" pitchFamily="34" charset="0"/>
+                          <a:ea typeface="Open Sans Light" pitchFamily="34" charset="0"/>
+                          <a:cs typeface="Open Sans Light" pitchFamily="34" charset="0"/>
+                        </a:rPr>
+                        <a:t> </a:t>
+                      </a:r>
+                      <a:r>
+                        <a:rPr lang="de-DE" baseline="0" dirty="0" err="1" smtClean="0">
+                          <a:solidFill>
+                            <a:schemeClr val="tx1">
+                              <a:lumMod val="65000"/>
+                              <a:lumOff val="35000"/>
+                            </a:schemeClr>
+                          </a:solidFill>
+                          <a:latin typeface="Open Sans Light" pitchFamily="34" charset="0"/>
+                          <a:ea typeface="Open Sans Light" pitchFamily="34" charset="0"/>
+                          <a:cs typeface="Open Sans Light" pitchFamily="34" charset="0"/>
+                        </a:rPr>
+                        <a:t>to</a:t>
+                      </a:r>
+                      <a:r>
+                        <a:rPr lang="de-DE" baseline="0" dirty="0" smtClean="0">
+                          <a:solidFill>
+                            <a:schemeClr val="tx1">
+                              <a:lumMod val="65000"/>
+                              <a:lumOff val="35000"/>
+                            </a:schemeClr>
+                          </a:solidFill>
+                          <a:latin typeface="Open Sans Light" pitchFamily="34" charset="0"/>
+                          <a:ea typeface="Open Sans Light" pitchFamily="34" charset="0"/>
+                          <a:cs typeface="Open Sans Light" pitchFamily="34" charset="0"/>
+                        </a:rPr>
+                        <a:t> </a:t>
+                      </a:r>
+                      <a:r>
+                        <a:rPr lang="de-DE" baseline="0" dirty="0" err="1" smtClean="0">
+                          <a:solidFill>
+                            <a:schemeClr val="tx1">
+                              <a:lumMod val="65000"/>
+                              <a:lumOff val="35000"/>
+                            </a:schemeClr>
+                          </a:solidFill>
+                          <a:latin typeface="Open Sans Light" pitchFamily="34" charset="0"/>
+                          <a:ea typeface="Open Sans Light" pitchFamily="34" charset="0"/>
+                          <a:cs typeface="Open Sans Light" pitchFamily="34" charset="0"/>
+                        </a:rPr>
+                        <a:t>be</a:t>
+                      </a:r>
+                      <a:r>
+                        <a:rPr lang="de-DE" baseline="0" dirty="0" smtClean="0">
+                          <a:solidFill>
+                            <a:schemeClr val="tx1">
+                              <a:lumMod val="65000"/>
+                              <a:lumOff val="35000"/>
+                            </a:schemeClr>
+                          </a:solidFill>
+                          <a:latin typeface="Open Sans Light" pitchFamily="34" charset="0"/>
+                          <a:ea typeface="Open Sans Light" pitchFamily="34" charset="0"/>
+                          <a:cs typeface="Open Sans Light" pitchFamily="34" charset="0"/>
+                        </a:rPr>
+                        <a:t> a </a:t>
+                      </a:r>
+                      <a:r>
+                        <a:rPr lang="de-DE" baseline="0" dirty="0" err="1" smtClean="0">
+                          <a:solidFill>
+                            <a:schemeClr val="tx1">
+                              <a:lumMod val="65000"/>
+                              <a:lumOff val="35000"/>
+                            </a:schemeClr>
+                          </a:solidFill>
+                          <a:latin typeface="Open Sans Light" pitchFamily="34" charset="0"/>
+                          <a:ea typeface="Open Sans Light" pitchFamily="34" charset="0"/>
+                          <a:cs typeface="Open Sans Light" pitchFamily="34" charset="0"/>
+                        </a:rPr>
+                        <a:t>Millionaire</a:t>
+                      </a:r>
+                      <a:r>
+                        <a:rPr lang="de-DE" baseline="0" dirty="0" smtClean="0">
+                          <a:solidFill>
+                            <a:schemeClr val="tx1">
+                              <a:lumMod val="65000"/>
+                              <a:lumOff val="35000"/>
+                            </a:schemeClr>
+                          </a:solidFill>
+                          <a:latin typeface="Open Sans Light" pitchFamily="34" charset="0"/>
+                          <a:ea typeface="Open Sans Light" pitchFamily="34" charset="0"/>
+                          <a:cs typeface="Open Sans Light" pitchFamily="34" charset="0"/>
+                        </a:rPr>
+                        <a:t>?</a:t>
+                      </a:r>
+                      <a:endParaRPr lang="de-DE" dirty="0">
+                        <a:solidFill>
+                          <a:schemeClr val="tx1">
+                            <a:lumMod val="65000"/>
+                            <a:lumOff val="35000"/>
+                          </a:schemeClr>
+                        </a:solidFill>
+                        <a:latin typeface="Open Sans Light" pitchFamily="34" charset="0"/>
+                        <a:ea typeface="Open Sans Light" pitchFamily="34" charset="0"/>
+                        <a:cs typeface="Open Sans Light" pitchFamily="34" charset="0"/>
+                      </a:endParaRPr>
+                    </a:p>
+                  </a:txBody>
+                  <a:tcPr>
+                    <a:lnB w="12700" cap="flat" cmpd="sng" algn="ctr">
+                      <a:solidFill>
+                        <a:schemeClr val="accent1">
+                          <a:lumMod val="50000"/>
+                        </a:schemeClr>
+                      </a:solidFill>
+                      <a:prstDash val="solid"/>
+                      <a:round/>
+                      <a:headEnd type="none" w="med" len="med"/>
+                      <a:tailEnd type="none" w="med" len="med"/>
+                    </a:lnB>
+                  </a:tcPr>
+                </a:tc>
+                <a:tc>
+                  <a:txBody>
+                    <a:bodyPr/>
+                    <a:lstStyle/>
+                    <a:p>
+                      <a:pPr algn="r"/>
+                      <a:r>
+                        <a:rPr lang="de-DE" dirty="0" smtClean="0">
+                          <a:solidFill>
+                            <a:schemeClr val="tx1">
+                              <a:lumMod val="65000"/>
+                              <a:lumOff val="35000"/>
+                            </a:schemeClr>
+                          </a:solidFill>
+                          <a:latin typeface="Open Sans Light" pitchFamily="34" charset="0"/>
+                          <a:ea typeface="Open Sans Light" pitchFamily="34" charset="0"/>
+                          <a:cs typeface="Open Sans Light" pitchFamily="34" charset="0"/>
+                        </a:rPr>
+                        <a:t>Teil:</a:t>
+                      </a:r>
+                      <a:r>
+                        <a:rPr lang="de-DE" baseline="0" dirty="0" smtClean="0">
+                          <a:solidFill>
+                            <a:schemeClr val="tx1">
+                              <a:lumMod val="65000"/>
+                              <a:lumOff val="35000"/>
+                            </a:schemeClr>
+                          </a:solidFill>
+                          <a:latin typeface="Open Sans Light" pitchFamily="34" charset="0"/>
+                          <a:ea typeface="Open Sans Light" pitchFamily="34" charset="0"/>
+                          <a:cs typeface="Open Sans Light" pitchFamily="34" charset="0"/>
+                        </a:rPr>
+                        <a:t> Nicht Funktionale Anforderungen</a:t>
+                      </a:r>
+                      <a:endParaRPr lang="de-DE" dirty="0">
+                        <a:solidFill>
+                          <a:schemeClr val="tx1">
+                            <a:lumMod val="65000"/>
+                            <a:lumOff val="35000"/>
+                          </a:schemeClr>
+                        </a:solidFill>
+                        <a:latin typeface="Open Sans Light" pitchFamily="34" charset="0"/>
+                        <a:ea typeface="Open Sans Light" pitchFamily="34" charset="0"/>
+                        <a:cs typeface="Open Sans Light" pitchFamily="34" charset="0"/>
+                      </a:endParaRPr>
+                    </a:p>
+                  </a:txBody>
+                  <a:tcPr>
+                    <a:lnB w="12700" cap="flat" cmpd="sng" algn="ctr">
+                      <a:solidFill>
+                        <a:schemeClr val="accent1">
+                          <a:lumMod val="50000"/>
+                        </a:schemeClr>
+                      </a:solidFill>
+                      <a:prstDash val="solid"/>
+                      <a:round/>
+                      <a:headEnd type="none" w="med" len="med"/>
+                      <a:tailEnd type="none" w="med" len="med"/>
+                    </a:lnB>
+                  </a:tcPr>
+                </a:tc>
+              </a:tr>
+            </a:tbl>
+          </a:graphicData>
+        </a:graphic>
+      </p:graphicFrame>
+      <p:sp>
+        <p:nvSpPr>
+          <p:cNvPr id="15" name="Textfeld 14"/>
+          <p:cNvSpPr txBox="1"/>
+          <p:nvPr/>
+        </p:nvSpPr>
+        <p:spPr>
+          <a:xfrm>
+            <a:off x="1115616" y="980728"/>
+            <a:ext cx="8028384" cy="584775"/>
+          </a:xfrm>
+          <a:prstGeom prst="rect">
+            <a:avLst/>
+          </a:prstGeom>
+          <a:noFill/>
+        </p:spPr>
+        <p:txBody>
+          <a:bodyPr wrap="square" rtlCol="0">
+            <a:spAutoFit/>
+          </a:bodyPr>
+          <a:lstStyle/>
+          <a:p>
+            <a:r>
+              <a:rPr lang="de-DE" sz="3200" dirty="0" smtClean="0">
+                <a:latin typeface="Open Sans Light" pitchFamily="34" charset="0"/>
+                <a:ea typeface="Open Sans Light" pitchFamily="34" charset="0"/>
+                <a:cs typeface="Open Sans Light" pitchFamily="34" charset="0"/>
+              </a:rPr>
+              <a:t>ZU ERSTELLENDE ARTEFAKTE</a:t>
+            </a:r>
+            <a:endParaRPr lang="de-DE" sz="3200" dirty="0">
+              <a:latin typeface="Open Sans Light" pitchFamily="34" charset="0"/>
+              <a:ea typeface="Open Sans Light" pitchFamily="34" charset="0"/>
+              <a:cs typeface="Open Sans Light" pitchFamily="34" charset="0"/>
+            </a:endParaRPr>
+          </a:p>
+        </p:txBody>
+      </p:sp>
+      <p:sp>
+        <p:nvSpPr>
+          <p:cNvPr id="9" name="Textfeld 8"/>
+          <p:cNvSpPr txBox="1"/>
+          <p:nvPr/>
+        </p:nvSpPr>
+        <p:spPr>
+          <a:xfrm>
+            <a:off x="323528" y="2132856"/>
+            <a:ext cx="8280920" cy="3831818"/>
+          </a:xfrm>
+          <a:prstGeom prst="rect">
+            <a:avLst/>
+          </a:prstGeom>
+          <a:noFill/>
+        </p:spPr>
+        <p:txBody>
+          <a:bodyPr wrap="square" rtlCol="0">
+            <a:spAutoFit/>
+          </a:bodyPr>
+          <a:lstStyle/>
+          <a:p>
+            <a:pPr>
+              <a:lnSpc>
+                <a:spcPct val="150000"/>
+              </a:lnSpc>
+              <a:buFont typeface="Courier New" pitchFamily="49" charset="0"/>
+              <a:buChar char="o"/>
+            </a:pPr>
+            <a:r>
+              <a:rPr lang="de-DE" dirty="0"/>
+              <a:t> </a:t>
+            </a:r>
+            <a:r>
+              <a:rPr lang="de-DE" dirty="0" smtClean="0">
+                <a:solidFill>
+                  <a:schemeClr val="tx1">
+                    <a:lumMod val="95000"/>
+                    <a:lumOff val="5000"/>
+                  </a:schemeClr>
+                </a:solidFill>
+                <a:latin typeface="Open Sans" pitchFamily="34" charset="0"/>
+                <a:ea typeface="Open Sans" pitchFamily="34" charset="0"/>
+                <a:cs typeface="Open Sans" pitchFamily="34" charset="0"/>
+              </a:rPr>
+              <a:t>Anforderungsanalyse</a:t>
+            </a:r>
+          </a:p>
+          <a:p>
+            <a:pPr>
+              <a:lnSpc>
+                <a:spcPct val="150000"/>
+              </a:lnSpc>
+              <a:buFont typeface="Courier New" pitchFamily="49" charset="0"/>
+              <a:buChar char="o"/>
+            </a:pPr>
+            <a:r>
+              <a:rPr lang="de-DE" dirty="0">
+                <a:solidFill>
+                  <a:schemeClr val="tx1">
+                    <a:lumMod val="95000"/>
+                    <a:lumOff val="5000"/>
+                  </a:schemeClr>
+                </a:solidFill>
+                <a:latin typeface="Open Sans" pitchFamily="34" charset="0"/>
+                <a:ea typeface="Open Sans" pitchFamily="34" charset="0"/>
+                <a:cs typeface="Open Sans" pitchFamily="34" charset="0"/>
+              </a:rPr>
+              <a:t> </a:t>
+            </a:r>
+            <a:r>
+              <a:rPr lang="de-DE" dirty="0" smtClean="0">
+                <a:solidFill>
+                  <a:schemeClr val="tx1">
+                    <a:lumMod val="95000"/>
+                    <a:lumOff val="5000"/>
+                  </a:schemeClr>
+                </a:solidFill>
+                <a:latin typeface="Open Sans" pitchFamily="34" charset="0"/>
+                <a:ea typeface="Open Sans" pitchFamily="34" charset="0"/>
+                <a:cs typeface="Open Sans" pitchFamily="34" charset="0"/>
+              </a:rPr>
+              <a:t>Use-Case Diagramm(e)</a:t>
+            </a:r>
+          </a:p>
+          <a:p>
+            <a:pPr>
+              <a:lnSpc>
+                <a:spcPct val="150000"/>
+              </a:lnSpc>
+              <a:buFont typeface="Courier New" pitchFamily="49" charset="0"/>
+              <a:buChar char="o"/>
+            </a:pPr>
+            <a:r>
+              <a:rPr lang="de-DE" dirty="0">
+                <a:solidFill>
+                  <a:schemeClr val="tx1">
+                    <a:lumMod val="95000"/>
+                    <a:lumOff val="5000"/>
+                  </a:schemeClr>
+                </a:solidFill>
+                <a:latin typeface="Open Sans" pitchFamily="34" charset="0"/>
+                <a:ea typeface="Open Sans" pitchFamily="34" charset="0"/>
+                <a:cs typeface="Open Sans" pitchFamily="34" charset="0"/>
+              </a:rPr>
+              <a:t> </a:t>
+            </a:r>
+            <a:r>
+              <a:rPr lang="de-DE" dirty="0" smtClean="0">
+                <a:solidFill>
+                  <a:schemeClr val="tx1">
+                    <a:lumMod val="95000"/>
+                    <a:lumOff val="5000"/>
+                  </a:schemeClr>
+                </a:solidFill>
+                <a:latin typeface="Open Sans" pitchFamily="34" charset="0"/>
+                <a:ea typeface="Open Sans" pitchFamily="34" charset="0"/>
+                <a:cs typeface="Open Sans" pitchFamily="34" charset="0"/>
+              </a:rPr>
+              <a:t>Aktivitätsdiagramm(e)</a:t>
+            </a:r>
+          </a:p>
+          <a:p>
+            <a:pPr>
+              <a:lnSpc>
+                <a:spcPct val="150000"/>
+              </a:lnSpc>
+              <a:buFont typeface="Courier New" pitchFamily="49" charset="0"/>
+              <a:buChar char="o"/>
+            </a:pPr>
+            <a:r>
+              <a:rPr lang="de-DE" dirty="0" smtClean="0">
+                <a:solidFill>
+                  <a:schemeClr val="tx1">
+                    <a:lumMod val="95000"/>
+                    <a:lumOff val="5000"/>
+                  </a:schemeClr>
+                </a:solidFill>
+                <a:latin typeface="Open Sans" pitchFamily="34" charset="0"/>
+                <a:ea typeface="Open Sans" pitchFamily="34" charset="0"/>
+                <a:cs typeface="Open Sans" pitchFamily="34" charset="0"/>
+              </a:rPr>
+              <a:t> Sequenzdiagramm(e)</a:t>
+            </a:r>
+          </a:p>
+          <a:p>
+            <a:pPr>
+              <a:lnSpc>
+                <a:spcPct val="150000"/>
+              </a:lnSpc>
+              <a:buFont typeface="Courier New" pitchFamily="49" charset="0"/>
+              <a:buChar char="o"/>
+            </a:pPr>
+            <a:r>
+              <a:rPr lang="de-DE" dirty="0" smtClean="0">
+                <a:solidFill>
+                  <a:schemeClr val="tx1">
+                    <a:lumMod val="95000"/>
+                    <a:lumOff val="5000"/>
+                  </a:schemeClr>
+                </a:solidFill>
+                <a:latin typeface="Open Sans" pitchFamily="34" charset="0"/>
+                <a:ea typeface="Open Sans" pitchFamily="34" charset="0"/>
+                <a:cs typeface="Open Sans" pitchFamily="34" charset="0"/>
+              </a:rPr>
+              <a:t> Klassendiagramm(e)</a:t>
+            </a:r>
+          </a:p>
+          <a:p>
+            <a:pPr>
+              <a:lnSpc>
+                <a:spcPct val="150000"/>
+              </a:lnSpc>
+              <a:buFont typeface="Courier New" pitchFamily="49" charset="0"/>
+              <a:buChar char="o"/>
+            </a:pPr>
+            <a:r>
+              <a:rPr lang="de-DE" dirty="0">
+                <a:solidFill>
+                  <a:schemeClr val="tx1">
+                    <a:lumMod val="95000"/>
+                    <a:lumOff val="5000"/>
+                  </a:schemeClr>
+                </a:solidFill>
+                <a:latin typeface="Open Sans" pitchFamily="34" charset="0"/>
+                <a:ea typeface="Open Sans" pitchFamily="34" charset="0"/>
+                <a:cs typeface="Open Sans" pitchFamily="34" charset="0"/>
+              </a:rPr>
+              <a:t> </a:t>
+            </a:r>
+            <a:r>
+              <a:rPr lang="de-DE" dirty="0" smtClean="0">
+                <a:solidFill>
+                  <a:schemeClr val="tx1">
+                    <a:lumMod val="95000"/>
+                    <a:lumOff val="5000"/>
+                  </a:schemeClr>
+                </a:solidFill>
+                <a:latin typeface="Open Sans" pitchFamily="34" charset="0"/>
+                <a:ea typeface="Open Sans" pitchFamily="34" charset="0"/>
+                <a:cs typeface="Open Sans" pitchFamily="34" charset="0"/>
+              </a:rPr>
+              <a:t>Testreports und schriftliche Testprozeduren</a:t>
+            </a:r>
+          </a:p>
+          <a:p>
+            <a:pPr>
+              <a:lnSpc>
+                <a:spcPct val="150000"/>
+              </a:lnSpc>
+              <a:buFont typeface="Courier New" pitchFamily="49" charset="0"/>
+              <a:buChar char="o"/>
+            </a:pPr>
+            <a:r>
+              <a:rPr lang="de-DE" dirty="0">
+                <a:solidFill>
+                  <a:schemeClr val="tx1">
+                    <a:lumMod val="95000"/>
+                    <a:lumOff val="5000"/>
+                  </a:schemeClr>
+                </a:solidFill>
+                <a:latin typeface="Open Sans" pitchFamily="34" charset="0"/>
+                <a:ea typeface="Open Sans" pitchFamily="34" charset="0"/>
+                <a:cs typeface="Open Sans" pitchFamily="34" charset="0"/>
+              </a:rPr>
+              <a:t> </a:t>
+            </a:r>
+            <a:r>
+              <a:rPr lang="de-DE" dirty="0" smtClean="0">
+                <a:solidFill>
+                  <a:schemeClr val="tx1">
+                    <a:lumMod val="95000"/>
+                    <a:lumOff val="5000"/>
+                  </a:schemeClr>
+                </a:solidFill>
+                <a:latin typeface="Open Sans" pitchFamily="34" charset="0"/>
+                <a:ea typeface="Open Sans" pitchFamily="34" charset="0"/>
+                <a:cs typeface="Open Sans" pitchFamily="34" charset="0"/>
+              </a:rPr>
+              <a:t>Installations-, ggf. Konfigurations- und Startanleitung</a:t>
+            </a:r>
+          </a:p>
+          <a:p>
+            <a:pPr>
+              <a:lnSpc>
+                <a:spcPct val="150000"/>
+              </a:lnSpc>
+              <a:buFont typeface="Courier New" pitchFamily="49" charset="0"/>
+              <a:buChar char="o"/>
+            </a:pPr>
+            <a:r>
+              <a:rPr lang="de-DE" dirty="0">
+                <a:solidFill>
+                  <a:schemeClr val="tx1">
+                    <a:lumMod val="95000"/>
+                    <a:lumOff val="5000"/>
+                  </a:schemeClr>
+                </a:solidFill>
+                <a:latin typeface="Open Sans" pitchFamily="34" charset="0"/>
+                <a:ea typeface="Open Sans" pitchFamily="34" charset="0"/>
+                <a:cs typeface="Open Sans" pitchFamily="34" charset="0"/>
+              </a:rPr>
+              <a:t> </a:t>
+            </a:r>
+            <a:r>
+              <a:rPr lang="de-DE" dirty="0" smtClean="0">
+                <a:solidFill>
+                  <a:schemeClr val="tx1">
+                    <a:lumMod val="95000"/>
+                    <a:lumOff val="5000"/>
+                  </a:schemeClr>
+                </a:solidFill>
+                <a:latin typeface="Open Sans" pitchFamily="34" charset="0"/>
+                <a:ea typeface="Open Sans" pitchFamily="34" charset="0"/>
+                <a:cs typeface="Open Sans" pitchFamily="34" charset="0"/>
+              </a:rPr>
+              <a:t>Lauffähiges Programm.</a:t>
+            </a:r>
+          </a:p>
+          <a:p>
+            <a:pPr>
+              <a:lnSpc>
+                <a:spcPct val="150000"/>
+              </a:lnSpc>
+              <a:buFont typeface="Courier New" pitchFamily="49" charset="0"/>
+              <a:buChar char="o"/>
+            </a:pPr>
+            <a:endParaRPr lang="de-DE" dirty="0" smtClean="0">
+              <a:solidFill>
+                <a:schemeClr val="tx1">
+                  <a:lumMod val="95000"/>
+                  <a:lumOff val="5000"/>
+                </a:schemeClr>
+              </a:solidFill>
+              <a:latin typeface="Open Sans" pitchFamily="34" charset="0"/>
+              <a:ea typeface="Open Sans" pitchFamily="34" charset="0"/>
+              <a:cs typeface="Open Sans" pitchFamily="34" charset="0"/>
+            </a:endParaRPr>
+          </a:p>
+        </p:txBody>
+      </p:sp>
+      <p:pic>
+        <p:nvPicPr>
+          <p:cNvPr id="16386" name="Picture 2"/>
+          <p:cNvPicPr>
+            <a:picLocks noChangeAspect="1" noChangeArrowheads="1"/>
+          </p:cNvPicPr>
+          <p:nvPr/>
+        </p:nvPicPr>
+        <p:blipFill>
+          <a:blip r:embed="rId3" cstate="print"/>
+          <a:srcRect/>
+          <a:stretch>
+            <a:fillRect/>
+          </a:stretch>
+        </p:blipFill>
+        <p:spPr bwMode="auto">
+          <a:xfrm>
+            <a:off x="323528" y="908720"/>
+            <a:ext cx="750243" cy="591568"/>
+          </a:xfrm>
+          <a:prstGeom prst="rect">
+            <a:avLst/>
+          </a:prstGeom>
+          <a:noFill/>
+          <a:ln w="9525">
+            <a:noFill/>
+            <a:miter lim="800000"/>
+            <a:headEnd/>
+            <a:tailEnd/>
+          </a:ln>
+          <a:effectLst/>
+        </p:spPr>
+      </p:pic>
     </p:spTree>
   </p:cSld>
   <p:clrMapOvr>
@@ -24780,7 +28316,7 @@
                 <a:ea typeface="Open Sans" pitchFamily="34" charset="0"/>
                 <a:cs typeface="Open Sans" pitchFamily="34" charset="0"/>
               </a:rPr>
-              <a:t>Ein Spieler hat das Ziel innerhalb von 15 Fragen €0 bis €1,000,000 zu gewinnen</a:t>
+              <a:t>Ein Spieler hat das Ziel innerhalb von 15 Fragen von €0 bis €1,000,000 zu gewinnen</a:t>
             </a:r>
           </a:p>
         </p:txBody>
@@ -27246,7 +30782,7 @@
                 <a:ea typeface="Open Sans" pitchFamily="34" charset="0"/>
                 <a:cs typeface="Open Sans" pitchFamily="34" charset="0"/>
               </a:rPr>
-              <a:t>Ein Spieler hat das Ziel innerhalb von 15 Fragen €0 bis €1,000,000 zu gewinnen</a:t>
+              <a:t>Ein Spieler hat das Ziel innerhalb von 15 Fragen von €0 bis €1,000,000 zu gewinnen</a:t>
             </a:r>
           </a:p>
           <a:p>
@@ -29732,7 +33268,7 @@
                 <a:ea typeface="Open Sans" pitchFamily="34" charset="0"/>
                 <a:cs typeface="Open Sans" pitchFamily="34" charset="0"/>
               </a:rPr>
-              <a:t>Ein Spieler hat das Ziel innerhalb von 15 Fragen €0 bis €1,000,000 zu gewinnen</a:t>
+              <a:t>Ein Spieler hat das Ziel innerhalb von 15 Fragen von €0 bis €1,000,000 zu gewinnen</a:t>
             </a:r>
           </a:p>
           <a:p>

</xml_diff>

<commit_message>
Exported Analyse, added NFRs to presentation
</commit_message>
<xml_diff>
--- a/Analyse/OOT-Projekt-Milestone-Presentation.pptx
+++ b/Analyse/OOT-Projekt-Milestone-Presentation.pptx
@@ -5,7 +5,7 @@
     <p:sldMasterId id="2147483648" r:id="rId1"/>
   </p:sldMasterIdLst>
   <p:notesMasterIdLst>
-    <p:notesMasterId r:id="rId32"/>
+    <p:notesMasterId r:id="rId33"/>
   </p:notesMasterIdLst>
   <p:sldIdLst>
     <p:sldId id="256" r:id="rId2"/>
@@ -37,7 +37,8 @@
     <p:sldId id="283" r:id="rId28"/>
     <p:sldId id="284" r:id="rId29"/>
     <p:sldId id="285" r:id="rId30"/>
-    <p:sldId id="286" r:id="rId31"/>
+    <p:sldId id="287" r:id="rId31"/>
+    <p:sldId id="286" r:id="rId32"/>
   </p:sldIdLst>
   <p:sldSz cx="9144000" cy="6858000" type="screen4x3"/>
   <p:notesSz cx="6858000" cy="9144000"/>
@@ -389,6 +390,11 @@
         </p:txBody>
       </p:sp>
     </p:spTree>
+    <p:extLst>
+      <p:ext uri="{BB962C8B-B14F-4D97-AF65-F5344CB8AC3E}">
+        <p14:creationId xmlns:p14="http://schemas.microsoft.com/office/powerpoint/2010/main" val="279450277"/>
+      </p:ext>
+    </p:extLst>
   </p:cSld>
   <p:clrMap bg1="lt1" tx1="dk1" bg2="lt2" tx2="dk2" accent1="accent1" accent2="accent2" accent3="accent3" accent4="accent4" accent5="accent5" accent6="accent6" hlink="hlink" folHlink="folHlink"/>
   <p:notesStyle>
@@ -2417,6 +2423,87 @@
             <a:fld id="{52C8AFA6-E92C-4EF3-92E1-75922C3E6757}" type="slidenum">
               <a:rPr lang="de-DE" smtClean="0"/>
               <a:t>30</a:t>
+            </a:fld>
+            <a:endParaRPr lang="de-DE"/>
+          </a:p>
+        </p:txBody>
+      </p:sp>
+    </p:spTree>
+  </p:cSld>
+  <p:clrMapOvr>
+    <a:masterClrMapping/>
+  </p:clrMapOvr>
+</p:notes>
+</file>
+
+<file path=ppt/notesSlides/notesSlide31.xml><?xml version="1.0" encoding="utf-8"?>
+<p:notes xmlns:a="http://schemas.openxmlformats.org/drawingml/2006/main" xmlns:r="http://schemas.openxmlformats.org/officeDocument/2006/relationships" xmlns:p="http://schemas.openxmlformats.org/presentationml/2006/main">
+  <p:cSld>
+    <p:spTree>
+      <p:nvGrpSpPr>
+        <p:cNvPr id="1" name=""/>
+        <p:cNvGrpSpPr/>
+        <p:nvPr/>
+      </p:nvGrpSpPr>
+      <p:grpSpPr>
+        <a:xfrm>
+          <a:off x="0" y="0"/>
+          <a:ext cx="0" cy="0"/>
+          <a:chOff x="0" y="0"/>
+          <a:chExt cx="0" cy="0"/>
+        </a:xfrm>
+      </p:grpSpPr>
+      <p:sp>
+        <p:nvSpPr>
+          <p:cNvPr id="2" name="Folienbildplatzhalter 1"/>
+          <p:cNvSpPr>
+            <a:spLocks noGrp="1" noRot="1" noChangeAspect="1"/>
+          </p:cNvSpPr>
+          <p:nvPr>
+            <p:ph type="sldImg"/>
+          </p:nvPr>
+        </p:nvSpPr>
+        <p:spPr/>
+      </p:sp>
+      <p:sp>
+        <p:nvSpPr>
+          <p:cNvPr id="3" name="Notizenplatzhalter 2"/>
+          <p:cNvSpPr>
+            <a:spLocks noGrp="1"/>
+          </p:cNvSpPr>
+          <p:nvPr>
+            <p:ph type="body" idx="1"/>
+          </p:nvPr>
+        </p:nvSpPr>
+        <p:spPr/>
+        <p:txBody>
+          <a:bodyPr>
+            <a:normAutofit/>
+          </a:bodyPr>
+          <a:lstStyle/>
+          <a:p>
+            <a:endParaRPr lang="de-DE"/>
+          </a:p>
+        </p:txBody>
+      </p:sp>
+      <p:sp>
+        <p:nvSpPr>
+          <p:cNvPr id="4" name="Foliennummernplatzhalter 3"/>
+          <p:cNvSpPr>
+            <a:spLocks noGrp="1"/>
+          </p:cNvSpPr>
+          <p:nvPr>
+            <p:ph type="sldNum" sz="quarter" idx="10"/>
+          </p:nvPr>
+        </p:nvSpPr>
+        <p:spPr/>
+        <p:txBody>
+          <a:bodyPr/>
+          <a:lstStyle/>
+          <a:p>
+            <a:fld id="{52C8AFA6-E92C-4EF3-92E1-75922C3E6757}" type="slidenum">
+              <a:rPr lang="de-DE" smtClean="0"/>
+              <a:t>31</a:t>
             </a:fld>
             <a:endParaRPr lang="de-DE"/>
           </a:p>
@@ -19012,21 +19099,7 @@
                 <a:ea typeface="Open Sans Light" pitchFamily="34" charset="0"/>
                 <a:cs typeface="Open Sans Light" pitchFamily="34" charset="0"/>
               </a:rPr>
-              <a:t> </a:t>
-            </a:r>
-            <a:r>
-              <a:rPr lang="de-DE" sz="2800" dirty="0" smtClean="0">
-                <a:solidFill>
-                  <a:schemeClr val="tx1">
-                    <a:lumMod val="85000"/>
-                    <a:lumOff val="15000"/>
-                  </a:schemeClr>
-                </a:solidFill>
-                <a:latin typeface="Open Sans Light" pitchFamily="34" charset="0"/>
-                <a:ea typeface="Open Sans Light" pitchFamily="34" charset="0"/>
-                <a:cs typeface="Open Sans Light" pitchFamily="34" charset="0"/>
-              </a:rPr>
-              <a:t>Use Case Diagramm (Generell)</a:t>
+              <a:t> Use Case Diagramm (Generell)</a:t>
             </a:r>
           </a:p>
           <a:p>
@@ -26353,6 +26426,771 @@
                           <a:cs typeface="Open Sans" pitchFamily="34" charset="0"/>
                         </a:rPr>
                         <a:t>30</a:t>
+                      </a:fld>
+                      <a:endParaRPr lang="de-DE" sz="1600" dirty="0">
+                        <a:solidFill>
+                          <a:schemeClr val="accent1">
+                            <a:lumMod val="75000"/>
+                          </a:schemeClr>
+                        </a:solidFill>
+                        <a:latin typeface="Open Sans" pitchFamily="34" charset="0"/>
+                        <a:ea typeface="Open Sans" pitchFamily="34" charset="0"/>
+                        <a:cs typeface="Open Sans" pitchFamily="34" charset="0"/>
+                      </a:endParaRPr>
+                    </a:p>
+                  </a:txBody>
+                  <a:tcPr>
+                    <a:lnL w="12700" cap="flat" cmpd="sng" algn="ctr">
+                      <a:noFill/>
+                      <a:prstDash val="solid"/>
+                      <a:round/>
+                      <a:headEnd type="none" w="med" len="med"/>
+                      <a:tailEnd type="none" w="med" len="med"/>
+                    </a:lnL>
+                    <a:lnR w="12700" cap="flat" cmpd="sng" algn="ctr">
+                      <a:noFill/>
+                      <a:prstDash val="solid"/>
+                      <a:round/>
+                      <a:headEnd type="none" w="med" len="med"/>
+                      <a:tailEnd type="none" w="med" len="med"/>
+                    </a:lnR>
+                    <a:lnT w="12700" cap="flat" cmpd="sng" algn="ctr">
+                      <a:solidFill>
+                        <a:schemeClr val="accent1">
+                          <a:lumMod val="50000"/>
+                        </a:schemeClr>
+                      </a:solidFill>
+                      <a:prstDash val="solid"/>
+                      <a:round/>
+                      <a:headEnd type="none" w="med" len="med"/>
+                      <a:tailEnd type="none" w="med" len="med"/>
+                    </a:lnT>
+                    <a:lnB w="12700" cap="flat" cmpd="sng" algn="ctr">
+                      <a:noFill/>
+                      <a:prstDash val="solid"/>
+                      <a:round/>
+                      <a:headEnd type="none" w="med" len="med"/>
+                      <a:tailEnd type="none" w="med" len="med"/>
+                    </a:lnB>
+                    <a:lnTlToBr w="12700" cmpd="sng">
+                      <a:noFill/>
+                      <a:prstDash val="solid"/>
+                    </a:lnTlToBr>
+                    <a:lnBlToTr w="12700" cmpd="sng">
+                      <a:noFill/>
+                      <a:prstDash val="solid"/>
+                    </a:lnBlToTr>
+                  </a:tcPr>
+                </a:tc>
+              </a:tr>
+            </a:tbl>
+          </a:graphicData>
+        </a:graphic>
+      </p:graphicFrame>
+      <p:graphicFrame>
+        <p:nvGraphicFramePr>
+          <p:cNvPr id="6" name="Tabelle 5"/>
+          <p:cNvGraphicFramePr>
+            <a:graphicFrameLocks noGrp="1"/>
+          </p:cNvGraphicFramePr>
+          <p:nvPr/>
+        </p:nvGraphicFramePr>
+        <p:xfrm>
+          <a:off x="395536" y="188640"/>
+          <a:ext cx="8496944" cy="370840"/>
+        </p:xfrm>
+        <a:graphic>
+          <a:graphicData uri="http://schemas.openxmlformats.org/drawingml/2006/table">
+            <a:tbl>
+              <a:tblPr firstRow="1" bandRow="1">
+                <a:tableStyleId>{2D5ABB26-0587-4C30-8999-92F81FD0307C}</a:tableStyleId>
+              </a:tblPr>
+              <a:tblGrid>
+                <a:gridCol w="4248472"/>
+                <a:gridCol w="4248472"/>
+              </a:tblGrid>
+              <a:tr h="370840">
+                <a:tc>
+                  <a:txBody>
+                    <a:bodyPr/>
+                    <a:lstStyle/>
+                    <a:p>
+                      <a:r>
+                        <a:rPr lang="de-DE" dirty="0" smtClean="0">
+                          <a:solidFill>
+                            <a:schemeClr val="tx1">
+                              <a:lumMod val="65000"/>
+                              <a:lumOff val="35000"/>
+                            </a:schemeClr>
+                          </a:solidFill>
+                          <a:latin typeface="Open Sans Light" pitchFamily="34" charset="0"/>
+                          <a:ea typeface="Open Sans Light" pitchFamily="34" charset="0"/>
+                          <a:cs typeface="Open Sans Light" pitchFamily="34" charset="0"/>
+                        </a:rPr>
+                        <a:t>Projekt:</a:t>
+                      </a:r>
+                      <a:r>
+                        <a:rPr lang="de-DE" baseline="0" dirty="0" smtClean="0">
+                          <a:solidFill>
+                            <a:schemeClr val="tx1">
+                              <a:lumMod val="65000"/>
+                              <a:lumOff val="35000"/>
+                            </a:schemeClr>
+                          </a:solidFill>
+                          <a:latin typeface="Open Sans Light" pitchFamily="34" charset="0"/>
+                          <a:ea typeface="Open Sans Light" pitchFamily="34" charset="0"/>
+                          <a:cs typeface="Open Sans Light" pitchFamily="34" charset="0"/>
+                        </a:rPr>
+                        <a:t> </a:t>
+                      </a:r>
+                      <a:r>
+                        <a:rPr lang="de-DE" dirty="0" smtClean="0">
+                          <a:solidFill>
+                            <a:schemeClr val="tx1">
+                              <a:lumMod val="65000"/>
+                              <a:lumOff val="35000"/>
+                            </a:schemeClr>
+                          </a:solidFill>
+                          <a:latin typeface="Open Sans Light" pitchFamily="34" charset="0"/>
+                          <a:ea typeface="Open Sans Light" pitchFamily="34" charset="0"/>
+                          <a:cs typeface="Open Sans Light" pitchFamily="34" charset="0"/>
+                        </a:rPr>
+                        <a:t>Who </a:t>
+                      </a:r>
+                      <a:r>
+                        <a:rPr lang="de-DE" dirty="0" err="1" smtClean="0">
+                          <a:solidFill>
+                            <a:schemeClr val="tx1">
+                              <a:lumMod val="65000"/>
+                              <a:lumOff val="35000"/>
+                            </a:schemeClr>
+                          </a:solidFill>
+                          <a:latin typeface="Open Sans Light" pitchFamily="34" charset="0"/>
+                          <a:ea typeface="Open Sans Light" pitchFamily="34" charset="0"/>
+                          <a:cs typeface="Open Sans Light" pitchFamily="34" charset="0"/>
+                        </a:rPr>
+                        <a:t>Wants</a:t>
+                      </a:r>
+                      <a:r>
+                        <a:rPr lang="de-DE" baseline="0" dirty="0" smtClean="0">
+                          <a:solidFill>
+                            <a:schemeClr val="tx1">
+                              <a:lumMod val="65000"/>
+                              <a:lumOff val="35000"/>
+                            </a:schemeClr>
+                          </a:solidFill>
+                          <a:latin typeface="Open Sans Light" pitchFamily="34" charset="0"/>
+                          <a:ea typeface="Open Sans Light" pitchFamily="34" charset="0"/>
+                          <a:cs typeface="Open Sans Light" pitchFamily="34" charset="0"/>
+                        </a:rPr>
+                        <a:t> </a:t>
+                      </a:r>
+                      <a:r>
+                        <a:rPr lang="de-DE" baseline="0" dirty="0" err="1" smtClean="0">
+                          <a:solidFill>
+                            <a:schemeClr val="tx1">
+                              <a:lumMod val="65000"/>
+                              <a:lumOff val="35000"/>
+                            </a:schemeClr>
+                          </a:solidFill>
+                          <a:latin typeface="Open Sans Light" pitchFamily="34" charset="0"/>
+                          <a:ea typeface="Open Sans Light" pitchFamily="34" charset="0"/>
+                          <a:cs typeface="Open Sans Light" pitchFamily="34" charset="0"/>
+                        </a:rPr>
+                        <a:t>to</a:t>
+                      </a:r>
+                      <a:r>
+                        <a:rPr lang="de-DE" baseline="0" dirty="0" smtClean="0">
+                          <a:solidFill>
+                            <a:schemeClr val="tx1">
+                              <a:lumMod val="65000"/>
+                              <a:lumOff val="35000"/>
+                            </a:schemeClr>
+                          </a:solidFill>
+                          <a:latin typeface="Open Sans Light" pitchFamily="34" charset="0"/>
+                          <a:ea typeface="Open Sans Light" pitchFamily="34" charset="0"/>
+                          <a:cs typeface="Open Sans Light" pitchFamily="34" charset="0"/>
+                        </a:rPr>
+                        <a:t> </a:t>
+                      </a:r>
+                      <a:r>
+                        <a:rPr lang="de-DE" baseline="0" dirty="0" err="1" smtClean="0">
+                          <a:solidFill>
+                            <a:schemeClr val="tx1">
+                              <a:lumMod val="65000"/>
+                              <a:lumOff val="35000"/>
+                            </a:schemeClr>
+                          </a:solidFill>
+                          <a:latin typeface="Open Sans Light" pitchFamily="34" charset="0"/>
+                          <a:ea typeface="Open Sans Light" pitchFamily="34" charset="0"/>
+                          <a:cs typeface="Open Sans Light" pitchFamily="34" charset="0"/>
+                        </a:rPr>
+                        <a:t>be</a:t>
+                      </a:r>
+                      <a:r>
+                        <a:rPr lang="de-DE" baseline="0" dirty="0" smtClean="0">
+                          <a:solidFill>
+                            <a:schemeClr val="tx1">
+                              <a:lumMod val="65000"/>
+                              <a:lumOff val="35000"/>
+                            </a:schemeClr>
+                          </a:solidFill>
+                          <a:latin typeface="Open Sans Light" pitchFamily="34" charset="0"/>
+                          <a:ea typeface="Open Sans Light" pitchFamily="34" charset="0"/>
+                          <a:cs typeface="Open Sans Light" pitchFamily="34" charset="0"/>
+                        </a:rPr>
+                        <a:t> a </a:t>
+                      </a:r>
+                      <a:r>
+                        <a:rPr lang="de-DE" baseline="0" dirty="0" err="1" smtClean="0">
+                          <a:solidFill>
+                            <a:schemeClr val="tx1">
+                              <a:lumMod val="65000"/>
+                              <a:lumOff val="35000"/>
+                            </a:schemeClr>
+                          </a:solidFill>
+                          <a:latin typeface="Open Sans Light" pitchFamily="34" charset="0"/>
+                          <a:ea typeface="Open Sans Light" pitchFamily="34" charset="0"/>
+                          <a:cs typeface="Open Sans Light" pitchFamily="34" charset="0"/>
+                        </a:rPr>
+                        <a:t>Millionaire</a:t>
+                      </a:r>
+                      <a:r>
+                        <a:rPr lang="de-DE" baseline="0" dirty="0" smtClean="0">
+                          <a:solidFill>
+                            <a:schemeClr val="tx1">
+                              <a:lumMod val="65000"/>
+                              <a:lumOff val="35000"/>
+                            </a:schemeClr>
+                          </a:solidFill>
+                          <a:latin typeface="Open Sans Light" pitchFamily="34" charset="0"/>
+                          <a:ea typeface="Open Sans Light" pitchFamily="34" charset="0"/>
+                          <a:cs typeface="Open Sans Light" pitchFamily="34" charset="0"/>
+                        </a:rPr>
+                        <a:t>?</a:t>
+                      </a:r>
+                      <a:endParaRPr lang="de-DE" dirty="0">
+                        <a:solidFill>
+                          <a:schemeClr val="tx1">
+                            <a:lumMod val="65000"/>
+                            <a:lumOff val="35000"/>
+                          </a:schemeClr>
+                        </a:solidFill>
+                        <a:latin typeface="Open Sans Light" pitchFamily="34" charset="0"/>
+                        <a:ea typeface="Open Sans Light" pitchFamily="34" charset="0"/>
+                        <a:cs typeface="Open Sans Light" pitchFamily="34" charset="0"/>
+                      </a:endParaRPr>
+                    </a:p>
+                  </a:txBody>
+                  <a:tcPr>
+                    <a:lnB w="12700" cap="flat" cmpd="sng" algn="ctr">
+                      <a:solidFill>
+                        <a:schemeClr val="accent1">
+                          <a:lumMod val="50000"/>
+                        </a:schemeClr>
+                      </a:solidFill>
+                      <a:prstDash val="solid"/>
+                      <a:round/>
+                      <a:headEnd type="none" w="med" len="med"/>
+                      <a:tailEnd type="none" w="med" len="med"/>
+                    </a:lnB>
+                  </a:tcPr>
+                </a:tc>
+                <a:tc>
+                  <a:txBody>
+                    <a:bodyPr/>
+                    <a:lstStyle/>
+                    <a:p>
+                      <a:pPr algn="r"/>
+                      <a:r>
+                        <a:rPr lang="de-DE" dirty="0" smtClean="0">
+                          <a:solidFill>
+                            <a:schemeClr val="tx1">
+                              <a:lumMod val="65000"/>
+                              <a:lumOff val="35000"/>
+                            </a:schemeClr>
+                          </a:solidFill>
+                          <a:latin typeface="Open Sans Light" pitchFamily="34" charset="0"/>
+                          <a:ea typeface="Open Sans Light" pitchFamily="34" charset="0"/>
+                          <a:cs typeface="Open Sans Light" pitchFamily="34" charset="0"/>
+                        </a:rPr>
+                        <a:t>Teil:</a:t>
+                      </a:r>
+                      <a:r>
+                        <a:rPr lang="de-DE" baseline="0" dirty="0" smtClean="0">
+                          <a:solidFill>
+                            <a:schemeClr val="tx1">
+                              <a:lumMod val="65000"/>
+                              <a:lumOff val="35000"/>
+                            </a:schemeClr>
+                          </a:solidFill>
+                          <a:latin typeface="Open Sans Light" pitchFamily="34" charset="0"/>
+                          <a:ea typeface="Open Sans Light" pitchFamily="34" charset="0"/>
+                          <a:cs typeface="Open Sans Light" pitchFamily="34" charset="0"/>
+                        </a:rPr>
+                        <a:t> Nicht Funktionale Anforderungen</a:t>
+                      </a:r>
+                      <a:endParaRPr lang="de-DE" dirty="0">
+                        <a:solidFill>
+                          <a:schemeClr val="tx1">
+                            <a:lumMod val="65000"/>
+                            <a:lumOff val="35000"/>
+                          </a:schemeClr>
+                        </a:solidFill>
+                        <a:latin typeface="Open Sans Light" pitchFamily="34" charset="0"/>
+                        <a:ea typeface="Open Sans Light" pitchFamily="34" charset="0"/>
+                        <a:cs typeface="Open Sans Light" pitchFamily="34" charset="0"/>
+                      </a:endParaRPr>
+                    </a:p>
+                  </a:txBody>
+                  <a:tcPr>
+                    <a:lnB w="12700" cap="flat" cmpd="sng" algn="ctr">
+                      <a:solidFill>
+                        <a:schemeClr val="accent1">
+                          <a:lumMod val="50000"/>
+                        </a:schemeClr>
+                      </a:solidFill>
+                      <a:prstDash val="solid"/>
+                      <a:round/>
+                      <a:headEnd type="none" w="med" len="med"/>
+                      <a:tailEnd type="none" w="med" len="med"/>
+                    </a:lnB>
+                  </a:tcPr>
+                </a:tc>
+              </a:tr>
+            </a:tbl>
+          </a:graphicData>
+        </a:graphic>
+      </p:graphicFrame>
+      <p:sp>
+        <p:nvSpPr>
+          <p:cNvPr id="15" name="Textfeld 14"/>
+          <p:cNvSpPr txBox="1"/>
+          <p:nvPr/>
+        </p:nvSpPr>
+        <p:spPr>
+          <a:xfrm>
+            <a:off x="1115616" y="980728"/>
+            <a:ext cx="8028384" cy="584775"/>
+          </a:xfrm>
+          <a:prstGeom prst="rect">
+            <a:avLst/>
+          </a:prstGeom>
+          <a:noFill/>
+        </p:spPr>
+        <p:txBody>
+          <a:bodyPr wrap="square" rtlCol="0">
+            <a:spAutoFit/>
+          </a:bodyPr>
+          <a:lstStyle/>
+          <a:p>
+            <a:r>
+              <a:rPr lang="de-DE" sz="3200" dirty="0" smtClean="0">
+                <a:latin typeface="Open Sans Light" pitchFamily="34" charset="0"/>
+                <a:ea typeface="Open Sans Light" pitchFamily="34" charset="0"/>
+                <a:cs typeface="Open Sans Light" pitchFamily="34" charset="0"/>
+              </a:rPr>
+              <a:t>WEITERE NFRs</a:t>
+            </a:r>
+            <a:endParaRPr lang="de-DE" sz="3200" dirty="0">
+              <a:latin typeface="Open Sans Light" pitchFamily="34" charset="0"/>
+              <a:ea typeface="Open Sans Light" pitchFamily="34" charset="0"/>
+              <a:cs typeface="Open Sans Light" pitchFamily="34" charset="0"/>
+            </a:endParaRPr>
+          </a:p>
+        </p:txBody>
+      </p:sp>
+      <p:sp>
+        <p:nvSpPr>
+          <p:cNvPr id="9" name="Textfeld 8"/>
+          <p:cNvSpPr txBox="1"/>
+          <p:nvPr/>
+        </p:nvSpPr>
+        <p:spPr>
+          <a:xfrm>
+            <a:off x="323528" y="2204864"/>
+            <a:ext cx="8280920" cy="3416320"/>
+          </a:xfrm>
+          <a:prstGeom prst="rect">
+            <a:avLst/>
+          </a:prstGeom>
+          <a:noFill/>
+        </p:spPr>
+        <p:txBody>
+          <a:bodyPr wrap="square" rtlCol="0">
+            <a:spAutoFit/>
+          </a:bodyPr>
+          <a:lstStyle/>
+          <a:p>
+            <a:pPr>
+              <a:lnSpc>
+                <a:spcPct val="150000"/>
+              </a:lnSpc>
+              <a:buFont typeface="Courier New" pitchFamily="49" charset="0"/>
+              <a:buChar char="o"/>
+            </a:pPr>
+            <a:r>
+              <a:rPr lang="de-DE" dirty="0"/>
+              <a:t> </a:t>
+            </a:r>
+            <a:r>
+              <a:rPr lang="de-DE" dirty="0" smtClean="0"/>
+              <a:t>Datenbank</a:t>
+            </a:r>
+          </a:p>
+          <a:p>
+            <a:pPr lvl="1">
+              <a:lnSpc>
+                <a:spcPct val="150000"/>
+              </a:lnSpc>
+              <a:buFont typeface="Courier New" pitchFamily="49" charset="0"/>
+              <a:buChar char="o"/>
+            </a:pPr>
+            <a:r>
+              <a:rPr lang="de-DE" dirty="0"/>
+              <a:t> </a:t>
+            </a:r>
+            <a:r>
+              <a:rPr lang="de-DE" dirty="0" smtClean="0"/>
+              <a:t>Lokal: </a:t>
+            </a:r>
+            <a:r>
+              <a:rPr lang="de-DE" dirty="0" err="1" smtClean="0"/>
+              <a:t>SQLite</a:t>
+            </a:r>
+            <a:r>
+              <a:rPr lang="de-DE" dirty="0" smtClean="0"/>
+              <a:t>, Remote: </a:t>
+            </a:r>
+            <a:r>
+              <a:rPr lang="de-DE" dirty="0" err="1" smtClean="0"/>
+              <a:t>MariaDB</a:t>
+            </a:r>
+            <a:endParaRPr lang="de-DE" dirty="0" smtClean="0"/>
+          </a:p>
+          <a:p>
+            <a:pPr lvl="1">
+              <a:lnSpc>
+                <a:spcPct val="150000"/>
+              </a:lnSpc>
+              <a:buFont typeface="Courier New" pitchFamily="49" charset="0"/>
+              <a:buChar char="o"/>
+            </a:pPr>
+            <a:r>
+              <a:rPr lang="de-DE" dirty="0"/>
+              <a:t> </a:t>
+            </a:r>
+            <a:r>
+              <a:rPr lang="de-DE" dirty="0" smtClean="0"/>
+              <a:t>Mit JDBC API, Apache DBCP</a:t>
+            </a:r>
+          </a:p>
+          <a:p>
+            <a:pPr>
+              <a:lnSpc>
+                <a:spcPct val="150000"/>
+              </a:lnSpc>
+              <a:buFont typeface="Courier New" pitchFamily="49" charset="0"/>
+              <a:buChar char="o"/>
+            </a:pPr>
+            <a:r>
+              <a:rPr lang="de-DE" dirty="0"/>
+              <a:t> </a:t>
+            </a:r>
+            <a:r>
+              <a:rPr lang="de-DE" dirty="0" err="1" smtClean="0"/>
+              <a:t>Maven</a:t>
+            </a:r>
+            <a:r>
+              <a:rPr lang="de-DE" dirty="0" smtClean="0"/>
+              <a:t> Multi-Module Projekt</a:t>
+            </a:r>
+          </a:p>
+          <a:p>
+            <a:pPr lvl="1">
+              <a:lnSpc>
+                <a:spcPct val="150000"/>
+              </a:lnSpc>
+              <a:buFont typeface="Courier New" pitchFamily="49" charset="0"/>
+              <a:buChar char="o"/>
+            </a:pPr>
+            <a:r>
+              <a:rPr lang="de-DE" dirty="0"/>
+              <a:t> </a:t>
+            </a:r>
+            <a:r>
+              <a:rPr lang="de-DE" dirty="0" err="1" smtClean="0"/>
+              <a:t>Surefire</a:t>
+            </a:r>
+            <a:r>
+              <a:rPr lang="de-DE" dirty="0" smtClean="0"/>
+              <a:t> Reports</a:t>
+            </a:r>
+          </a:p>
+          <a:p>
+            <a:pPr>
+              <a:lnSpc>
+                <a:spcPct val="150000"/>
+              </a:lnSpc>
+              <a:buFont typeface="Courier New" pitchFamily="49" charset="0"/>
+              <a:buChar char="o"/>
+            </a:pPr>
+            <a:r>
+              <a:rPr lang="de-DE" dirty="0"/>
+              <a:t> </a:t>
+            </a:r>
+            <a:r>
+              <a:rPr lang="de-DE" dirty="0" err="1" smtClean="0"/>
+              <a:t>Versionierung</a:t>
+            </a:r>
+            <a:r>
+              <a:rPr lang="de-DE" dirty="0" smtClean="0"/>
+              <a:t> mittels </a:t>
+            </a:r>
+            <a:r>
+              <a:rPr lang="de-DE" dirty="0" err="1" smtClean="0"/>
+              <a:t>Github</a:t>
+            </a:r>
+            <a:r>
+              <a:rPr lang="de-DE" dirty="0"/>
+              <a:t> </a:t>
+            </a:r>
+            <a:r>
+              <a:rPr lang="de-DE" dirty="0" smtClean="0"/>
+              <a:t>(http://oot.marcelherd.com)</a:t>
+            </a:r>
+            <a:endParaRPr lang="de-DE" dirty="0"/>
+          </a:p>
+          <a:p>
+            <a:pPr>
+              <a:lnSpc>
+                <a:spcPct val="150000"/>
+              </a:lnSpc>
+              <a:buFont typeface="Courier New" pitchFamily="49" charset="0"/>
+              <a:buChar char="o"/>
+            </a:pPr>
+            <a:r>
+              <a:rPr lang="de-DE" dirty="0" smtClean="0"/>
+              <a:t> </a:t>
+            </a:r>
+            <a:r>
+              <a:rPr lang="de-DE" dirty="0" err="1" smtClean="0"/>
+              <a:t>Continuous</a:t>
+            </a:r>
+            <a:r>
+              <a:rPr lang="de-DE" dirty="0" smtClean="0"/>
+              <a:t> Integration mittels Travis CI</a:t>
+            </a:r>
+          </a:p>
+          <a:p>
+            <a:pPr>
+              <a:lnSpc>
+                <a:spcPct val="150000"/>
+              </a:lnSpc>
+              <a:buFont typeface="Courier New" pitchFamily="49" charset="0"/>
+              <a:buChar char="o"/>
+            </a:pPr>
+            <a:endParaRPr lang="de-DE" dirty="0" smtClean="0"/>
+          </a:p>
+        </p:txBody>
+      </p:sp>
+      <p:pic>
+        <p:nvPicPr>
+          <p:cNvPr id="15362" name="Picture 2"/>
+          <p:cNvPicPr>
+            <a:picLocks noChangeAspect="1" noChangeArrowheads="1"/>
+          </p:cNvPicPr>
+          <p:nvPr/>
+        </p:nvPicPr>
+        <p:blipFill>
+          <a:blip r:embed="rId3" cstate="print"/>
+          <a:srcRect/>
+          <a:stretch>
+            <a:fillRect/>
+          </a:stretch>
+        </p:blipFill>
+        <p:spPr bwMode="auto">
+          <a:xfrm>
+            <a:off x="251520" y="908720"/>
+            <a:ext cx="757215" cy="656253"/>
+          </a:xfrm>
+          <a:prstGeom prst="rect">
+            <a:avLst/>
+          </a:prstGeom>
+          <a:noFill/>
+          <a:ln w="9525">
+            <a:noFill/>
+            <a:miter lim="800000"/>
+            <a:headEnd/>
+            <a:tailEnd/>
+          </a:ln>
+          <a:effectLst/>
+        </p:spPr>
+      </p:pic>
+    </p:spTree>
+    <p:extLst>
+      <p:ext uri="{BB962C8B-B14F-4D97-AF65-F5344CB8AC3E}">
+        <p14:creationId xmlns:p14="http://schemas.microsoft.com/office/powerpoint/2010/main" val="825040727"/>
+      </p:ext>
+    </p:extLst>
+  </p:cSld>
+  <p:clrMapOvr>
+    <a:masterClrMapping/>
+  </p:clrMapOvr>
+  <p:timing>
+    <p:tnLst>
+      <p:par>
+        <p:cTn id="1" dur="indefinite" restart="never" nodeType="tmRoot"/>
+      </p:par>
+    </p:tnLst>
+  </p:timing>
+</p:sld>
+</file>
+
+<file path=ppt/slides/slide31.xml><?xml version="1.0" encoding="utf-8"?>
+<p:sld xmlns:a="http://schemas.openxmlformats.org/drawingml/2006/main" xmlns:r="http://schemas.openxmlformats.org/officeDocument/2006/relationships" xmlns:p="http://schemas.openxmlformats.org/presentationml/2006/main">
+  <p:cSld>
+    <p:spTree>
+      <p:nvGrpSpPr>
+        <p:cNvPr id="1" name=""/>
+        <p:cNvGrpSpPr/>
+        <p:nvPr/>
+      </p:nvGrpSpPr>
+      <p:grpSpPr>
+        <a:xfrm>
+          <a:off x="0" y="0"/>
+          <a:ext cx="0" cy="0"/>
+          <a:chOff x="0" y="0"/>
+          <a:chExt cx="0" cy="0"/>
+        </a:xfrm>
+      </p:grpSpPr>
+      <p:graphicFrame>
+        <p:nvGraphicFramePr>
+          <p:cNvPr id="8" name="Tabelle 7"/>
+          <p:cNvGraphicFramePr>
+            <a:graphicFrameLocks noGrp="1"/>
+          </p:cNvGraphicFramePr>
+          <p:nvPr/>
+        </p:nvGraphicFramePr>
+        <p:xfrm>
+          <a:off x="251520" y="6309320"/>
+          <a:ext cx="8640960" cy="370840"/>
+        </p:xfrm>
+        <a:graphic>
+          <a:graphicData uri="http://schemas.openxmlformats.org/drawingml/2006/table">
+            <a:tbl>
+              <a:tblPr firstRow="1" bandRow="1">
+                <a:tableStyleId>{2D5ABB26-0587-4C30-8999-92F81FD0307C}</a:tableStyleId>
+              </a:tblPr>
+              <a:tblGrid>
+                <a:gridCol w="4320480"/>
+                <a:gridCol w="4320480"/>
+              </a:tblGrid>
+              <a:tr h="370840">
+                <a:tc>
+                  <a:txBody>
+                    <a:bodyPr/>
+                    <a:lstStyle/>
+                    <a:p>
+                      <a:r>
+                        <a:rPr lang="de-DE" sz="1600" dirty="0" smtClean="0">
+                          <a:solidFill>
+                            <a:schemeClr val="accent1">
+                              <a:lumMod val="75000"/>
+                            </a:schemeClr>
+                          </a:solidFill>
+                          <a:latin typeface="Open Sans" pitchFamily="34" charset="0"/>
+                          <a:ea typeface="Open Sans" pitchFamily="34" charset="0"/>
+                          <a:cs typeface="Open Sans" pitchFamily="34" charset="0"/>
+                        </a:rPr>
+                        <a:t>Gruppe: Millionär // SS2016 // OOT</a:t>
+                      </a:r>
+                      <a:endParaRPr lang="de-DE" sz="1600" dirty="0">
+                        <a:solidFill>
+                          <a:schemeClr val="accent1">
+                            <a:lumMod val="75000"/>
+                          </a:schemeClr>
+                        </a:solidFill>
+                        <a:latin typeface="Open Sans" pitchFamily="34" charset="0"/>
+                        <a:ea typeface="Open Sans" pitchFamily="34" charset="0"/>
+                        <a:cs typeface="Open Sans" pitchFamily="34" charset="0"/>
+                      </a:endParaRPr>
+                    </a:p>
+                  </a:txBody>
+                  <a:tcPr>
+                    <a:lnL w="12700" cap="flat" cmpd="sng" algn="ctr">
+                      <a:noFill/>
+                      <a:prstDash val="solid"/>
+                      <a:round/>
+                      <a:headEnd type="none" w="med" len="med"/>
+                      <a:tailEnd type="none" w="med" len="med"/>
+                    </a:lnL>
+                    <a:lnR w="12700" cap="flat" cmpd="sng" algn="ctr">
+                      <a:noFill/>
+                      <a:prstDash val="solid"/>
+                      <a:round/>
+                      <a:headEnd type="none" w="med" len="med"/>
+                      <a:tailEnd type="none" w="med" len="med"/>
+                    </a:lnR>
+                    <a:lnT w="12700" cap="flat" cmpd="sng" algn="ctr">
+                      <a:solidFill>
+                        <a:schemeClr val="accent1">
+                          <a:lumMod val="50000"/>
+                        </a:schemeClr>
+                      </a:solidFill>
+                      <a:prstDash val="solid"/>
+                      <a:round/>
+                      <a:headEnd type="none" w="med" len="med"/>
+                      <a:tailEnd type="none" w="med" len="med"/>
+                    </a:lnT>
+                    <a:lnB w="12700" cap="flat" cmpd="sng" algn="ctr">
+                      <a:noFill/>
+                      <a:prstDash val="solid"/>
+                      <a:round/>
+                      <a:headEnd type="none" w="med" len="med"/>
+                      <a:tailEnd type="none" w="med" len="med"/>
+                    </a:lnB>
+                    <a:lnTlToBr w="12700" cmpd="sng">
+                      <a:noFill/>
+                      <a:prstDash val="solid"/>
+                    </a:lnTlToBr>
+                    <a:lnBlToTr w="12700" cmpd="sng">
+                      <a:noFill/>
+                      <a:prstDash val="solid"/>
+                    </a:lnBlToTr>
+                  </a:tcPr>
+                </a:tc>
+                <a:tc>
+                  <a:txBody>
+                    <a:bodyPr/>
+                    <a:lstStyle/>
+                    <a:p>
+                      <a:pPr algn="r"/>
+                      <a:r>
+                        <a:rPr lang="de-DE" sz="1600" dirty="0" smtClean="0">
+                          <a:solidFill>
+                            <a:schemeClr val="accent1">
+                              <a:lumMod val="75000"/>
+                            </a:schemeClr>
+                          </a:solidFill>
+                          <a:latin typeface="Open Sans" pitchFamily="34" charset="0"/>
+                          <a:ea typeface="Open Sans" pitchFamily="34" charset="0"/>
+                          <a:cs typeface="Open Sans" pitchFamily="34" charset="0"/>
+                        </a:rPr>
+                        <a:t>Folie: </a:t>
+                      </a:r>
+                      <a:fld id="{328F9375-978F-43FF-828F-1CDC57A20BD8}" type="slidenum">
+                        <a:rPr lang="de-DE" sz="1600" smtClean="0">
+                          <a:solidFill>
+                            <a:schemeClr val="accent1">
+                              <a:lumMod val="75000"/>
+                            </a:schemeClr>
+                          </a:solidFill>
+                          <a:latin typeface="Open Sans" pitchFamily="34" charset="0"/>
+                          <a:ea typeface="Open Sans" pitchFamily="34" charset="0"/>
+                          <a:cs typeface="Open Sans" pitchFamily="34" charset="0"/>
+                        </a:rPr>
+                        <a:t>31</a:t>
                       </a:fld>
                       <a:endParaRPr lang="de-DE" sz="1600" dirty="0">
                         <a:solidFill>
@@ -33318,11 +34156,6 @@
               </a:rPr>
               <a:t>Für jede gestellte Frage stehen dem Spieler vier Antwortmöglichkeiten zur Verfügung wobei nur eine die richtige Lösung darstellt</a:t>
             </a:r>
-            <a:endParaRPr lang="de-DE" dirty="0" smtClean="0">
-              <a:latin typeface="Open Sans" pitchFamily="34" charset="0"/>
-              <a:ea typeface="Open Sans" pitchFamily="34" charset="0"/>
-              <a:cs typeface="Open Sans" pitchFamily="34" charset="0"/>
-            </a:endParaRPr>
           </a:p>
         </p:txBody>
       </p:sp>
@@ -35776,17 +36609,6 @@
               </a:rPr>
               <a:t>Antwort steigt sein potenzieller Gewinn in Abhängigkeit von der beantworteten Frage </a:t>
             </a:r>
-            <a:endParaRPr lang="de-DE" dirty="0" smtClean="0">
-              <a:solidFill>
-                <a:schemeClr val="tx1">
-                  <a:lumMod val="95000"/>
-                  <a:lumOff val="5000"/>
-                </a:schemeClr>
-              </a:solidFill>
-              <a:latin typeface="Open Sans" pitchFamily="34" charset="0"/>
-              <a:ea typeface="Open Sans" pitchFamily="34" charset="0"/>
-              <a:cs typeface="Open Sans" pitchFamily="34" charset="0"/>
-            </a:endParaRPr>
           </a:p>
         </p:txBody>
       </p:sp>

</xml_diff>